<commit_message>
fix formatting in State Machine slides
</commit_message>
<xml_diff>
--- a/week9/State Machine.pptx
+++ b/week9/State Machine.pptx
@@ -33,6 +33,7 @@
     <p:sldId id="276" r:id="rId26"/>
     <p:sldId id="277" r:id="rId27"/>
     <p:sldId id="278" r:id="rId28"/>
+    <p:sldId id="279" r:id="rId29"/>
   </p:sldIdLst>
   <p:sldSz cx="9144000" cy="6858000"/>
   <p:notesSz cx="7099300" cy="10234612"/>
@@ -208,7 +209,7 @@
           <a:bodyPr lIns="0" rIns="0" tIns="0" bIns="0" anchor="b"/>
           <a:p>
             <a:pPr algn="r"/>
-            <a:fld id="{5094811C-4513-4554-899F-D680D7694960}" type="slidenum">
+            <a:fld id="{0A574D3D-25FD-4F83-A321-D9C31B38CE36}" type="slidenum">
               <a:rPr lang="en-US" sz="1400">
                 <a:latin typeface="Times New Roman"/>
               </a:rPr>
@@ -243,14 +244,14 @@
       </p:grpSpPr>
       <p:sp>
         <p:nvSpPr>
-          <p:cNvPr id="193" name="CustomShape 1"/>
+          <p:cNvPr id="196" name="CustomShape 1"/>
           <p:cNvSpPr/>
           <p:nvPr/>
         </p:nvSpPr>
         <p:spPr>
           <a:xfrm>
             <a:off x="709560" y="4861080"/>
-            <a:ext cx="5678280" cy="4604760"/>
+            <a:ext cx="5677920" cy="4604400"/>
           </a:xfrm>
           <a:prstGeom prst="rect">
             <a:avLst/>
@@ -285,14 +286,14 @@
       </p:grpSpPr>
       <p:sp>
         <p:nvSpPr>
-          <p:cNvPr id="197" name="CustomShape 1"/>
+          <p:cNvPr id="200" name="CustomShape 1"/>
           <p:cNvSpPr/>
           <p:nvPr/>
         </p:nvSpPr>
         <p:spPr>
           <a:xfrm>
             <a:off x="709560" y="4861080"/>
-            <a:ext cx="5678280" cy="4604760"/>
+            <a:ext cx="5677920" cy="4604400"/>
           </a:xfrm>
           <a:prstGeom prst="rect">
             <a:avLst/>
@@ -327,14 +328,14 @@
       </p:grpSpPr>
       <p:sp>
         <p:nvSpPr>
-          <p:cNvPr id="198" name="CustomShape 1"/>
+          <p:cNvPr id="201" name="CustomShape 1"/>
           <p:cNvSpPr/>
           <p:nvPr/>
         </p:nvSpPr>
         <p:spPr>
           <a:xfrm>
             <a:off x="709560" y="4861080"/>
-            <a:ext cx="5678280" cy="4604760"/>
+            <a:ext cx="5677920" cy="4604400"/>
           </a:xfrm>
           <a:prstGeom prst="rect">
             <a:avLst/>
@@ -369,14 +370,14 @@
       </p:grpSpPr>
       <p:sp>
         <p:nvSpPr>
-          <p:cNvPr id="199" name="CustomShape 1"/>
+          <p:cNvPr id="202" name="CustomShape 1"/>
           <p:cNvSpPr/>
           <p:nvPr/>
         </p:nvSpPr>
         <p:spPr>
           <a:xfrm>
             <a:off x="709560" y="4861080"/>
-            <a:ext cx="5678280" cy="4604760"/>
+            <a:ext cx="5677920" cy="4604400"/>
           </a:xfrm>
           <a:prstGeom prst="rect">
             <a:avLst/>
@@ -411,14 +412,14 @@
       </p:grpSpPr>
       <p:sp>
         <p:nvSpPr>
-          <p:cNvPr id="200" name="CustomShape 1"/>
+          <p:cNvPr id="203" name="CustomShape 1"/>
           <p:cNvSpPr/>
           <p:nvPr/>
         </p:nvSpPr>
         <p:spPr>
           <a:xfrm>
             <a:off x="709560" y="4861080"/>
-            <a:ext cx="5678280" cy="4604760"/>
+            <a:ext cx="5677920" cy="4604400"/>
           </a:xfrm>
           <a:prstGeom prst="rect">
             <a:avLst/>
@@ -453,14 +454,14 @@
       </p:grpSpPr>
       <p:sp>
         <p:nvSpPr>
-          <p:cNvPr id="201" name="CustomShape 1"/>
+          <p:cNvPr id="204" name="CustomShape 1"/>
           <p:cNvSpPr/>
           <p:nvPr/>
         </p:nvSpPr>
         <p:spPr>
           <a:xfrm>
             <a:off x="709560" y="4861080"/>
-            <a:ext cx="5678280" cy="4604760"/>
+            <a:ext cx="5677920" cy="4604400"/>
           </a:xfrm>
           <a:prstGeom prst="rect">
             <a:avLst/>
@@ -495,14 +496,14 @@
       </p:grpSpPr>
       <p:sp>
         <p:nvSpPr>
-          <p:cNvPr id="202" name="CustomShape 1"/>
+          <p:cNvPr id="205" name="CustomShape 1"/>
           <p:cNvSpPr/>
           <p:nvPr/>
         </p:nvSpPr>
         <p:spPr>
           <a:xfrm>
             <a:off x="709560" y="4861080"/>
-            <a:ext cx="5678280" cy="4604760"/>
+            <a:ext cx="5677920" cy="4604400"/>
           </a:xfrm>
           <a:prstGeom prst="rect">
             <a:avLst/>
@@ -537,14 +538,14 @@
       </p:grpSpPr>
       <p:sp>
         <p:nvSpPr>
-          <p:cNvPr id="203" name="CustomShape 1"/>
+          <p:cNvPr id="206" name="CustomShape 1"/>
           <p:cNvSpPr/>
           <p:nvPr/>
         </p:nvSpPr>
         <p:spPr>
           <a:xfrm>
             <a:off x="709560" y="4861080"/>
-            <a:ext cx="5678280" cy="4604760"/>
+            <a:ext cx="5677920" cy="4604400"/>
           </a:xfrm>
           <a:prstGeom prst="rect">
             <a:avLst/>
@@ -579,14 +580,14 @@
       </p:grpSpPr>
       <p:sp>
         <p:nvSpPr>
-          <p:cNvPr id="204" name="CustomShape 1"/>
+          <p:cNvPr id="207" name="CustomShape 1"/>
           <p:cNvSpPr/>
           <p:nvPr/>
         </p:nvSpPr>
         <p:spPr>
           <a:xfrm>
             <a:off x="709560" y="4861080"/>
-            <a:ext cx="5678280" cy="4604760"/>
+            <a:ext cx="5677920" cy="4604400"/>
           </a:xfrm>
           <a:prstGeom prst="rect">
             <a:avLst/>
@@ -621,14 +622,14 @@
       </p:grpSpPr>
       <p:sp>
         <p:nvSpPr>
-          <p:cNvPr id="205" name="CustomShape 1"/>
+          <p:cNvPr id="208" name="CustomShape 1"/>
           <p:cNvSpPr/>
           <p:nvPr/>
         </p:nvSpPr>
         <p:spPr>
           <a:xfrm>
             <a:off x="709560" y="4861080"/>
-            <a:ext cx="5678280" cy="4604760"/>
+            <a:ext cx="5677920" cy="4604400"/>
           </a:xfrm>
           <a:prstGeom prst="rect">
             <a:avLst/>
@@ -663,14 +664,14 @@
       </p:grpSpPr>
       <p:sp>
         <p:nvSpPr>
-          <p:cNvPr id="194" name="CustomShape 1"/>
+          <p:cNvPr id="197" name="CustomShape 1"/>
           <p:cNvSpPr/>
           <p:nvPr/>
         </p:nvSpPr>
         <p:spPr>
           <a:xfrm>
             <a:off x="709560" y="4861080"/>
-            <a:ext cx="5678280" cy="4604760"/>
+            <a:ext cx="5677920" cy="4604400"/>
           </a:xfrm>
           <a:prstGeom prst="rect">
             <a:avLst/>
@@ -705,14 +706,14 @@
       </p:grpSpPr>
       <p:sp>
         <p:nvSpPr>
-          <p:cNvPr id="206" name="CustomShape 1"/>
+          <p:cNvPr id="209" name="CustomShape 1"/>
           <p:cNvSpPr/>
           <p:nvPr/>
         </p:nvSpPr>
         <p:spPr>
           <a:xfrm>
             <a:off x="709560" y="4861080"/>
-            <a:ext cx="5678280" cy="4604760"/>
+            <a:ext cx="5677920" cy="4604400"/>
           </a:xfrm>
           <a:prstGeom prst="rect">
             <a:avLst/>
@@ -747,14 +748,14 @@
       </p:grpSpPr>
       <p:sp>
         <p:nvSpPr>
-          <p:cNvPr id="207" name="CustomShape 1"/>
+          <p:cNvPr id="210" name="CustomShape 1"/>
           <p:cNvSpPr/>
           <p:nvPr/>
         </p:nvSpPr>
         <p:spPr>
           <a:xfrm>
             <a:off x="709560" y="4861080"/>
-            <a:ext cx="5678280" cy="4604760"/>
+            <a:ext cx="5677920" cy="4604400"/>
           </a:xfrm>
           <a:prstGeom prst="rect">
             <a:avLst/>
@@ -789,14 +790,14 @@
       </p:grpSpPr>
       <p:sp>
         <p:nvSpPr>
-          <p:cNvPr id="208" name="CustomShape 1"/>
+          <p:cNvPr id="211" name="CustomShape 1"/>
           <p:cNvSpPr/>
           <p:nvPr/>
         </p:nvSpPr>
         <p:spPr>
           <a:xfrm>
             <a:off x="709560" y="4861080"/>
-            <a:ext cx="5678280" cy="4604760"/>
+            <a:ext cx="5677920" cy="4604400"/>
           </a:xfrm>
           <a:prstGeom prst="rect">
             <a:avLst/>
@@ -831,14 +832,56 @@
       </p:grpSpPr>
       <p:sp>
         <p:nvSpPr>
-          <p:cNvPr id="209" name="CustomShape 1"/>
+          <p:cNvPr id="212" name="CustomShape 1"/>
           <p:cNvSpPr/>
           <p:nvPr/>
         </p:nvSpPr>
         <p:spPr>
           <a:xfrm>
             <a:off x="709560" y="4861080"/>
-            <a:ext cx="5678280" cy="4604760"/>
+            <a:ext cx="5677920" cy="4604400"/>
+          </a:xfrm>
+          <a:prstGeom prst="rect">
+            <a:avLst/>
+          </a:prstGeom>
+          <a:noFill/>
+          <a:ln>
+            <a:noFill/>
+          </a:ln>
+        </p:spPr>
+      </p:sp>
+    </p:spTree>
+  </p:cSld>
+</p:notes>
+</file>
+
+<file path=ppt/notesSlides/notesSlide24.xml><?xml version="1.0" encoding="utf-8"?>
+<p:notes xmlns:a="http://schemas.openxmlformats.org/drawingml/2006/main" xmlns:p="http://schemas.openxmlformats.org/presentationml/2006/main" xmlns:r="http://schemas.openxmlformats.org/officeDocument/2006/relationships">
+  <p:cSld>
+    <p:spTree>
+      <p:nvGrpSpPr>
+        <p:cNvPr id="1" name=""/>
+        <p:cNvGrpSpPr/>
+        <p:nvPr/>
+      </p:nvGrpSpPr>
+      <p:grpSpPr>
+        <a:xfrm>
+          <a:off x="0" y="0"/>
+          <a:ext cx="0" cy="0"/>
+          <a:chOff x="0" y="0"/>
+          <a:chExt cx="0" cy="0"/>
+        </a:xfrm>
+      </p:grpSpPr>
+      <p:sp>
+        <p:nvSpPr>
+          <p:cNvPr id="213" name="CustomShape 1"/>
+          <p:cNvSpPr/>
+          <p:nvPr/>
+        </p:nvSpPr>
+        <p:spPr>
+          <a:xfrm>
+            <a:off x="709560" y="4861080"/>
+            <a:ext cx="5677920" cy="4604400"/>
           </a:xfrm>
           <a:prstGeom prst="rect">
             <a:avLst/>
@@ -873,14 +916,14 @@
       </p:grpSpPr>
       <p:sp>
         <p:nvSpPr>
-          <p:cNvPr id="195" name="CustomShape 1"/>
+          <p:cNvPr id="198" name="CustomShape 1"/>
           <p:cNvSpPr/>
           <p:nvPr/>
         </p:nvSpPr>
         <p:spPr>
           <a:xfrm>
             <a:off x="709560" y="4861080"/>
-            <a:ext cx="5678280" cy="4604760"/>
+            <a:ext cx="5677920" cy="4604400"/>
           </a:xfrm>
           <a:prstGeom prst="rect">
             <a:avLst/>
@@ -915,14 +958,14 @@
       </p:grpSpPr>
       <p:sp>
         <p:nvSpPr>
-          <p:cNvPr id="196" name="CustomShape 1"/>
+          <p:cNvPr id="199" name="CustomShape 1"/>
           <p:cNvSpPr/>
           <p:nvPr/>
         </p:nvSpPr>
         <p:spPr>
           <a:xfrm>
             <a:off x="709560" y="4861080"/>
-            <a:ext cx="5678280" cy="4604760"/>
+            <a:ext cx="5677920" cy="4604400"/>
           </a:xfrm>
           <a:prstGeom prst="rect">
             <a:avLst/>
@@ -990,7 +1033,7 @@
         <p:spPr>
           <a:xfrm>
             <a:off x="610920" y="165960"/>
-            <a:ext cx="7917840" cy="956160"/>
+            <a:ext cx="7917480" cy="956160"/>
           </a:xfrm>
           <a:prstGeom prst="rect">
             <a:avLst/>
@@ -1017,7 +1060,7 @@
         <p:spPr>
           <a:xfrm>
             <a:off x="674640" y="1400040"/>
-            <a:ext cx="3863880" cy="2127600"/>
+            <a:ext cx="1884960" cy="2127600"/>
           </a:xfrm>
           <a:prstGeom prst="rect">
             <a:avLst/>
@@ -1043,7 +1086,7 @@
         <p:spPr>
           <a:xfrm>
             <a:off x="674640" y="3730320"/>
-            <a:ext cx="3863880" cy="2127600"/>
+            <a:ext cx="1884960" cy="2127600"/>
           </a:xfrm>
           <a:prstGeom prst="rect">
             <a:avLst/>
@@ -1091,7 +1134,7 @@
         <p:spPr>
           <a:xfrm>
             <a:off x="610920" y="165960"/>
-            <a:ext cx="7917840" cy="956160"/>
+            <a:ext cx="7917480" cy="956160"/>
           </a:xfrm>
           <a:prstGeom prst="rect">
             <a:avLst/>
@@ -1118,7 +1161,7 @@
         <p:spPr>
           <a:xfrm>
             <a:off x="674640" y="1400040"/>
-            <a:ext cx="1885320" cy="2127600"/>
+            <a:ext cx="919800" cy="2127600"/>
           </a:xfrm>
           <a:prstGeom prst="rect">
             <a:avLst/>
@@ -1143,8 +1186,8 @@
         </p:nvSpPr>
         <p:spPr>
           <a:xfrm>
-            <a:off x="2654640" y="1400040"/>
-            <a:ext cx="1885320" cy="2127600"/>
+            <a:off x="1640880" y="1400040"/>
+            <a:ext cx="919800" cy="2127600"/>
           </a:xfrm>
           <a:prstGeom prst="rect">
             <a:avLst/>
@@ -1169,8 +1212,8 @@
         </p:nvSpPr>
         <p:spPr>
           <a:xfrm>
-            <a:off x="2654640" y="3730320"/>
-            <a:ext cx="1885320" cy="2127600"/>
+            <a:off x="1640880" y="3730320"/>
+            <a:ext cx="919800" cy="2127600"/>
           </a:xfrm>
           <a:prstGeom prst="rect">
             <a:avLst/>
@@ -1196,7 +1239,7 @@
         <p:spPr>
           <a:xfrm>
             <a:off x="674640" y="3730320"/>
-            <a:ext cx="1885320" cy="2127600"/>
+            <a:ext cx="919800" cy="2127600"/>
           </a:xfrm>
           <a:prstGeom prst="rect">
             <a:avLst/>
@@ -1244,7 +1287,7 @@
         <p:spPr>
           <a:xfrm>
             <a:off x="610920" y="165960"/>
-            <a:ext cx="7917840" cy="956160"/>
+            <a:ext cx="7917480" cy="956160"/>
           </a:xfrm>
           <a:prstGeom prst="rect">
             <a:avLst/>
@@ -1271,7 +1314,7 @@
         <p:spPr>
           <a:xfrm>
             <a:off x="674640" y="1400040"/>
-            <a:ext cx="3863880" cy="4460760"/>
+            <a:ext cx="1884960" cy="4460400"/>
           </a:xfrm>
           <a:prstGeom prst="rect">
             <a:avLst/>
@@ -1297,7 +1340,7 @@
         <p:spPr>
           <a:xfrm>
             <a:off x="674640" y="1400040"/>
-            <a:ext cx="3863880" cy="4460760"/>
+            <a:ext cx="1884960" cy="4460400"/>
           </a:xfrm>
           <a:prstGeom prst="rect">
             <a:avLst/>
@@ -1324,8 +1367,8 @@
         </p:blipFill>
         <p:spPr>
           <a:xfrm>
-            <a:off x="674280" y="2088720"/>
-            <a:ext cx="3863880" cy="3082680"/>
+            <a:off x="674640" y="2878200"/>
+            <a:ext cx="1884960" cy="1503720"/>
           </a:xfrm>
           <a:prstGeom prst="rect">
             <a:avLst/>
@@ -1349,8 +1392,8 @@
         </p:blipFill>
         <p:spPr>
           <a:xfrm>
-            <a:off x="674280" y="2088720"/>
-            <a:ext cx="3863880" cy="3082680"/>
+            <a:off x="674640" y="2878200"/>
+            <a:ext cx="1884960" cy="1503720"/>
           </a:xfrm>
           <a:prstGeom prst="rect">
             <a:avLst/>
@@ -1417,7 +1460,7 @@
         <p:spPr>
           <a:xfrm>
             <a:off x="610920" y="165960"/>
-            <a:ext cx="7917840" cy="956160"/>
+            <a:ext cx="7917480" cy="956160"/>
           </a:xfrm>
           <a:prstGeom prst="rect">
             <a:avLst/>
@@ -1444,7 +1487,7 @@
         <p:spPr>
           <a:xfrm>
             <a:off x="674640" y="1400040"/>
-            <a:ext cx="3863880" cy="4461120"/>
+            <a:ext cx="1884960" cy="4460760"/>
           </a:xfrm>
           <a:prstGeom prst="rect">
             <a:avLst/>
@@ -1493,7 +1536,7 @@
         <p:spPr>
           <a:xfrm>
             <a:off x="610920" y="165960"/>
-            <a:ext cx="7917840" cy="956160"/>
+            <a:ext cx="7917480" cy="956160"/>
           </a:xfrm>
           <a:prstGeom prst="rect">
             <a:avLst/>
@@ -1520,7 +1563,7 @@
         <p:spPr>
           <a:xfrm>
             <a:off x="674640" y="1400040"/>
-            <a:ext cx="3863880" cy="4460760"/>
+            <a:ext cx="1884960" cy="4460400"/>
           </a:xfrm>
           <a:prstGeom prst="rect">
             <a:avLst/>
@@ -1568,7 +1611,7 @@
         <p:spPr>
           <a:xfrm>
             <a:off x="610920" y="165960"/>
-            <a:ext cx="7917840" cy="956160"/>
+            <a:ext cx="7917480" cy="956160"/>
           </a:xfrm>
           <a:prstGeom prst="rect">
             <a:avLst/>
@@ -1595,7 +1638,7 @@
         <p:spPr>
           <a:xfrm>
             <a:off x="674640" y="1400040"/>
-            <a:ext cx="1885320" cy="4460760"/>
+            <a:ext cx="919800" cy="4460400"/>
           </a:xfrm>
           <a:prstGeom prst="rect">
             <a:avLst/>
@@ -1620,8 +1663,8 @@
         </p:nvSpPr>
         <p:spPr>
           <a:xfrm>
-            <a:off x="2654640" y="1400040"/>
-            <a:ext cx="1885320" cy="4460760"/>
+            <a:off x="1640880" y="1400040"/>
+            <a:ext cx="919800" cy="4460400"/>
           </a:xfrm>
           <a:prstGeom prst="rect">
             <a:avLst/>
@@ -1669,7 +1712,7 @@
         <p:spPr>
           <a:xfrm>
             <a:off x="610920" y="165960"/>
-            <a:ext cx="7917840" cy="956160"/>
+            <a:ext cx="7917480" cy="956160"/>
           </a:xfrm>
           <a:prstGeom prst="rect">
             <a:avLst/>
@@ -1718,7 +1761,7 @@
         <p:spPr>
           <a:xfrm>
             <a:off x="610920" y="165960"/>
-            <a:ext cx="7917840" cy="4432320"/>
+            <a:ext cx="7917480" cy="4432320"/>
           </a:xfrm>
           <a:prstGeom prst="rect">
             <a:avLst/>
@@ -1767,7 +1810,7 @@
         <p:spPr>
           <a:xfrm>
             <a:off x="610920" y="165960"/>
-            <a:ext cx="7917840" cy="956160"/>
+            <a:ext cx="7917480" cy="956160"/>
           </a:xfrm>
           <a:prstGeom prst="rect">
             <a:avLst/>
@@ -1794,7 +1837,7 @@
         <p:spPr>
           <a:xfrm>
             <a:off x="674640" y="1400040"/>
-            <a:ext cx="1885320" cy="2127600"/>
+            <a:ext cx="919800" cy="2127600"/>
           </a:xfrm>
           <a:prstGeom prst="rect">
             <a:avLst/>
@@ -1820,7 +1863,7 @@
         <p:spPr>
           <a:xfrm>
             <a:off x="674640" y="3730320"/>
-            <a:ext cx="1885320" cy="2127600"/>
+            <a:ext cx="919800" cy="2127600"/>
           </a:xfrm>
           <a:prstGeom prst="rect">
             <a:avLst/>
@@ -1845,8 +1888,8 @@
         </p:nvSpPr>
         <p:spPr>
           <a:xfrm>
-            <a:off x="2654640" y="1400040"/>
-            <a:ext cx="1885320" cy="4460760"/>
+            <a:off x="1640880" y="1400040"/>
+            <a:ext cx="919800" cy="4460400"/>
           </a:xfrm>
           <a:prstGeom prst="rect">
             <a:avLst/>
@@ -1894,7 +1937,7 @@
         <p:spPr>
           <a:xfrm>
             <a:off x="610920" y="165960"/>
-            <a:ext cx="7917840" cy="956160"/>
+            <a:ext cx="7917480" cy="956160"/>
           </a:xfrm>
           <a:prstGeom prst="rect">
             <a:avLst/>
@@ -1921,7 +1964,7 @@
         <p:spPr>
           <a:xfrm>
             <a:off x="674640" y="1400040"/>
-            <a:ext cx="3863880" cy="4461120"/>
+            <a:ext cx="1884960" cy="4460760"/>
           </a:xfrm>
           <a:prstGeom prst="rect">
             <a:avLst/>
@@ -1970,7 +2013,7 @@
         <p:spPr>
           <a:xfrm>
             <a:off x="610920" y="165960"/>
-            <a:ext cx="7917840" cy="956160"/>
+            <a:ext cx="7917480" cy="956160"/>
           </a:xfrm>
           <a:prstGeom prst="rect">
             <a:avLst/>
@@ -1997,7 +2040,7 @@
         <p:spPr>
           <a:xfrm>
             <a:off x="674640" y="1400040"/>
-            <a:ext cx="1885320" cy="4460760"/>
+            <a:ext cx="919800" cy="4460400"/>
           </a:xfrm>
           <a:prstGeom prst="rect">
             <a:avLst/>
@@ -2022,8 +2065,8 @@
         </p:nvSpPr>
         <p:spPr>
           <a:xfrm>
-            <a:off x="2654640" y="1400040"/>
-            <a:ext cx="1885320" cy="2127600"/>
+            <a:off x="1640880" y="1400040"/>
+            <a:ext cx="919800" cy="2127600"/>
           </a:xfrm>
           <a:prstGeom prst="rect">
             <a:avLst/>
@@ -2048,8 +2091,8 @@
         </p:nvSpPr>
         <p:spPr>
           <a:xfrm>
-            <a:off x="2654640" y="3730320"/>
-            <a:ext cx="1885320" cy="2127600"/>
+            <a:off x="1640880" y="3730320"/>
+            <a:ext cx="919800" cy="2127600"/>
           </a:xfrm>
           <a:prstGeom prst="rect">
             <a:avLst/>
@@ -2097,7 +2140,7 @@
         <p:spPr>
           <a:xfrm>
             <a:off x="610920" y="165960"/>
-            <a:ext cx="7917840" cy="956160"/>
+            <a:ext cx="7917480" cy="956160"/>
           </a:xfrm>
           <a:prstGeom prst="rect">
             <a:avLst/>
@@ -2124,7 +2167,7 @@
         <p:spPr>
           <a:xfrm>
             <a:off x="674640" y="1400040"/>
-            <a:ext cx="1885320" cy="2127600"/>
+            <a:ext cx="919800" cy="2127600"/>
           </a:xfrm>
           <a:prstGeom prst="rect">
             <a:avLst/>
@@ -2149,8 +2192,8 @@
         </p:nvSpPr>
         <p:spPr>
           <a:xfrm>
-            <a:off x="2654640" y="1400040"/>
-            <a:ext cx="1885320" cy="2127600"/>
+            <a:off x="1640880" y="1400040"/>
+            <a:ext cx="919800" cy="2127600"/>
           </a:xfrm>
           <a:prstGeom prst="rect">
             <a:avLst/>
@@ -2176,7 +2219,7 @@
         <p:spPr>
           <a:xfrm>
             <a:off x="674640" y="3730320"/>
-            <a:ext cx="3863880" cy="2127600"/>
+            <a:ext cx="1884960" cy="2127600"/>
           </a:xfrm>
           <a:prstGeom prst="rect">
             <a:avLst/>
@@ -2224,7 +2267,7 @@
         <p:spPr>
           <a:xfrm>
             <a:off x="610920" y="165960"/>
-            <a:ext cx="7917840" cy="956160"/>
+            <a:ext cx="7917480" cy="956160"/>
           </a:xfrm>
           <a:prstGeom prst="rect">
             <a:avLst/>
@@ -2251,7 +2294,7 @@
         <p:spPr>
           <a:xfrm>
             <a:off x="674640" y="1400040"/>
-            <a:ext cx="3863880" cy="2127600"/>
+            <a:ext cx="1884960" cy="2127600"/>
           </a:xfrm>
           <a:prstGeom prst="rect">
             <a:avLst/>
@@ -2277,7 +2320,7 @@
         <p:spPr>
           <a:xfrm>
             <a:off x="674640" y="3730320"/>
-            <a:ext cx="3863880" cy="2127600"/>
+            <a:ext cx="1884960" cy="2127600"/>
           </a:xfrm>
           <a:prstGeom prst="rect">
             <a:avLst/>
@@ -2325,7 +2368,7 @@
         <p:spPr>
           <a:xfrm>
             <a:off x="610920" y="165960"/>
-            <a:ext cx="7917840" cy="956160"/>
+            <a:ext cx="7917480" cy="956160"/>
           </a:xfrm>
           <a:prstGeom prst="rect">
             <a:avLst/>
@@ -2352,7 +2395,7 @@
         <p:spPr>
           <a:xfrm>
             <a:off x="674640" y="1400040"/>
-            <a:ext cx="1885320" cy="2127600"/>
+            <a:ext cx="919800" cy="2127600"/>
           </a:xfrm>
           <a:prstGeom prst="rect">
             <a:avLst/>
@@ -2377,8 +2420,8 @@
         </p:nvSpPr>
         <p:spPr>
           <a:xfrm>
-            <a:off x="2654640" y="1400040"/>
-            <a:ext cx="1885320" cy="2127600"/>
+            <a:off x="1640880" y="1400040"/>
+            <a:ext cx="919800" cy="2127600"/>
           </a:xfrm>
           <a:prstGeom prst="rect">
             <a:avLst/>
@@ -2403,8 +2446,8 @@
         </p:nvSpPr>
         <p:spPr>
           <a:xfrm>
-            <a:off x="2654640" y="3730320"/>
-            <a:ext cx="1885320" cy="2127600"/>
+            <a:off x="1640880" y="3730320"/>
+            <a:ext cx="919800" cy="2127600"/>
           </a:xfrm>
           <a:prstGeom prst="rect">
             <a:avLst/>
@@ -2430,7 +2473,7 @@
         <p:spPr>
           <a:xfrm>
             <a:off x="674640" y="3730320"/>
-            <a:ext cx="1885320" cy="2127600"/>
+            <a:ext cx="919800" cy="2127600"/>
           </a:xfrm>
           <a:prstGeom prst="rect">
             <a:avLst/>
@@ -2478,7 +2521,7 @@
         <p:spPr>
           <a:xfrm>
             <a:off x="610920" y="165960"/>
-            <a:ext cx="7917840" cy="956160"/>
+            <a:ext cx="7917480" cy="956160"/>
           </a:xfrm>
           <a:prstGeom prst="rect">
             <a:avLst/>
@@ -2505,7 +2548,7 @@
         <p:spPr>
           <a:xfrm>
             <a:off x="674640" y="1400040"/>
-            <a:ext cx="3863880" cy="4460760"/>
+            <a:ext cx="1884960" cy="4460400"/>
           </a:xfrm>
           <a:prstGeom prst="rect">
             <a:avLst/>
@@ -2531,7 +2574,7 @@
         <p:spPr>
           <a:xfrm>
             <a:off x="674640" y="1400040"/>
-            <a:ext cx="3863880" cy="4460760"/>
+            <a:ext cx="1884960" cy="4460400"/>
           </a:xfrm>
           <a:prstGeom prst="rect">
             <a:avLst/>
@@ -2558,8 +2601,8 @@
         </p:blipFill>
         <p:spPr>
           <a:xfrm>
-            <a:off x="674280" y="2088720"/>
-            <a:ext cx="3863880" cy="3082680"/>
+            <a:off x="674640" y="2878200"/>
+            <a:ext cx="1884960" cy="1503720"/>
           </a:xfrm>
           <a:prstGeom prst="rect">
             <a:avLst/>
@@ -2583,8 +2626,8 @@
         </p:blipFill>
         <p:spPr>
           <a:xfrm>
-            <a:off x="674280" y="2088720"/>
-            <a:ext cx="3863880" cy="3082680"/>
+            <a:off x="674640" y="2878200"/>
+            <a:ext cx="1884960" cy="1503720"/>
           </a:xfrm>
           <a:prstGeom prst="rect">
             <a:avLst/>
@@ -2651,7 +2694,7 @@
         <p:spPr>
           <a:xfrm>
             <a:off x="610920" y="165960"/>
-            <a:ext cx="7917840" cy="956160"/>
+            <a:ext cx="7917480" cy="956160"/>
           </a:xfrm>
           <a:prstGeom prst="rect">
             <a:avLst/>
@@ -2678,7 +2721,7 @@
         <p:spPr>
           <a:xfrm>
             <a:off x="674640" y="1400040"/>
-            <a:ext cx="3863880" cy="4461120"/>
+            <a:ext cx="1884960" cy="4460760"/>
           </a:xfrm>
           <a:prstGeom prst="rect">
             <a:avLst/>
@@ -2727,7 +2770,7 @@
         <p:spPr>
           <a:xfrm>
             <a:off x="610920" y="165960"/>
-            <a:ext cx="7917840" cy="956160"/>
+            <a:ext cx="7917480" cy="956160"/>
           </a:xfrm>
           <a:prstGeom prst="rect">
             <a:avLst/>
@@ -2754,7 +2797,7 @@
         <p:spPr>
           <a:xfrm>
             <a:off x="674640" y="1400040"/>
-            <a:ext cx="3863880" cy="4460760"/>
+            <a:ext cx="1884960" cy="4460400"/>
           </a:xfrm>
           <a:prstGeom prst="rect">
             <a:avLst/>
@@ -2802,7 +2845,7 @@
         <p:spPr>
           <a:xfrm>
             <a:off x="610920" y="165960"/>
-            <a:ext cx="7917840" cy="956160"/>
+            <a:ext cx="7917480" cy="956160"/>
           </a:xfrm>
           <a:prstGeom prst="rect">
             <a:avLst/>
@@ -2829,7 +2872,7 @@
         <p:spPr>
           <a:xfrm>
             <a:off x="674640" y="1400040"/>
-            <a:ext cx="1885320" cy="4460760"/>
+            <a:ext cx="919800" cy="4460400"/>
           </a:xfrm>
           <a:prstGeom prst="rect">
             <a:avLst/>
@@ -2854,8 +2897,8 @@
         </p:nvSpPr>
         <p:spPr>
           <a:xfrm>
-            <a:off x="2654640" y="1400040"/>
-            <a:ext cx="1885320" cy="4460760"/>
+            <a:off x="1640880" y="1400040"/>
+            <a:ext cx="919800" cy="4460400"/>
           </a:xfrm>
           <a:prstGeom prst="rect">
             <a:avLst/>
@@ -2903,7 +2946,7 @@
         <p:spPr>
           <a:xfrm>
             <a:off x="610920" y="165960"/>
-            <a:ext cx="7917840" cy="956160"/>
+            <a:ext cx="7917480" cy="956160"/>
           </a:xfrm>
           <a:prstGeom prst="rect">
             <a:avLst/>
@@ -2952,7 +2995,7 @@
         <p:spPr>
           <a:xfrm>
             <a:off x="610920" y="165960"/>
-            <a:ext cx="7917840" cy="956160"/>
+            <a:ext cx="7917480" cy="956160"/>
           </a:xfrm>
           <a:prstGeom prst="rect">
             <a:avLst/>
@@ -2979,7 +3022,7 @@
         <p:spPr>
           <a:xfrm>
             <a:off x="674640" y="1400040"/>
-            <a:ext cx="3863880" cy="4460760"/>
+            <a:ext cx="1884960" cy="4460400"/>
           </a:xfrm>
           <a:prstGeom prst="rect">
             <a:avLst/>
@@ -3027,7 +3070,7 @@
         <p:spPr>
           <a:xfrm>
             <a:off x="610920" y="165960"/>
-            <a:ext cx="7917840" cy="4432320"/>
+            <a:ext cx="7917480" cy="4432320"/>
           </a:xfrm>
           <a:prstGeom prst="rect">
             <a:avLst/>
@@ -3076,7 +3119,7 @@
         <p:spPr>
           <a:xfrm>
             <a:off x="610920" y="165960"/>
-            <a:ext cx="7917840" cy="956160"/>
+            <a:ext cx="7917480" cy="956160"/>
           </a:xfrm>
           <a:prstGeom prst="rect">
             <a:avLst/>
@@ -3103,7 +3146,7 @@
         <p:spPr>
           <a:xfrm>
             <a:off x="674640" y="1400040"/>
-            <a:ext cx="1885320" cy="2127600"/>
+            <a:ext cx="919800" cy="2127600"/>
           </a:xfrm>
           <a:prstGeom prst="rect">
             <a:avLst/>
@@ -3129,7 +3172,7 @@
         <p:spPr>
           <a:xfrm>
             <a:off x="674640" y="3730320"/>
-            <a:ext cx="1885320" cy="2127600"/>
+            <a:ext cx="919800" cy="2127600"/>
           </a:xfrm>
           <a:prstGeom prst="rect">
             <a:avLst/>
@@ -3154,8 +3197,8 @@
         </p:nvSpPr>
         <p:spPr>
           <a:xfrm>
-            <a:off x="2654640" y="1400040"/>
-            <a:ext cx="1885320" cy="4460760"/>
+            <a:off x="1640880" y="1400040"/>
+            <a:ext cx="919800" cy="4460400"/>
           </a:xfrm>
           <a:prstGeom prst="rect">
             <a:avLst/>
@@ -3203,7 +3246,7 @@
         <p:spPr>
           <a:xfrm>
             <a:off x="610920" y="165960"/>
-            <a:ext cx="7917840" cy="956160"/>
+            <a:ext cx="7917480" cy="956160"/>
           </a:xfrm>
           <a:prstGeom prst="rect">
             <a:avLst/>
@@ -3230,7 +3273,7 @@
         <p:spPr>
           <a:xfrm>
             <a:off x="674640" y="1400040"/>
-            <a:ext cx="1885320" cy="4460760"/>
+            <a:ext cx="919800" cy="4460400"/>
           </a:xfrm>
           <a:prstGeom prst="rect">
             <a:avLst/>
@@ -3255,8 +3298,8 @@
         </p:nvSpPr>
         <p:spPr>
           <a:xfrm>
-            <a:off x="2654640" y="1400040"/>
-            <a:ext cx="1885320" cy="2127600"/>
+            <a:off x="1640880" y="1400040"/>
+            <a:ext cx="919800" cy="2127600"/>
           </a:xfrm>
           <a:prstGeom prst="rect">
             <a:avLst/>
@@ -3281,8 +3324,8 @@
         </p:nvSpPr>
         <p:spPr>
           <a:xfrm>
-            <a:off x="2654640" y="3730320"/>
-            <a:ext cx="1885320" cy="2127600"/>
+            <a:off x="1640880" y="3730320"/>
+            <a:ext cx="919800" cy="2127600"/>
           </a:xfrm>
           <a:prstGeom prst="rect">
             <a:avLst/>
@@ -3330,7 +3373,7 @@
         <p:spPr>
           <a:xfrm>
             <a:off x="610920" y="165960"/>
-            <a:ext cx="7917840" cy="956160"/>
+            <a:ext cx="7917480" cy="956160"/>
           </a:xfrm>
           <a:prstGeom prst="rect">
             <a:avLst/>
@@ -3357,7 +3400,7 @@
         <p:spPr>
           <a:xfrm>
             <a:off x="674640" y="1400040"/>
-            <a:ext cx="1885320" cy="2127600"/>
+            <a:ext cx="919800" cy="2127600"/>
           </a:xfrm>
           <a:prstGeom prst="rect">
             <a:avLst/>
@@ -3382,8 +3425,8 @@
         </p:nvSpPr>
         <p:spPr>
           <a:xfrm>
-            <a:off x="2654640" y="1400040"/>
-            <a:ext cx="1885320" cy="2127600"/>
+            <a:off x="1640880" y="1400040"/>
+            <a:ext cx="919800" cy="2127600"/>
           </a:xfrm>
           <a:prstGeom prst="rect">
             <a:avLst/>
@@ -3409,7 +3452,7 @@
         <p:spPr>
           <a:xfrm>
             <a:off x="674640" y="3730320"/>
-            <a:ext cx="3863880" cy="2127600"/>
+            <a:ext cx="1884960" cy="2127600"/>
           </a:xfrm>
           <a:prstGeom prst="rect">
             <a:avLst/>
@@ -3457,7 +3500,7 @@
         <p:spPr>
           <a:xfrm>
             <a:off x="610920" y="165960"/>
-            <a:ext cx="7917840" cy="956160"/>
+            <a:ext cx="7917480" cy="956160"/>
           </a:xfrm>
           <a:prstGeom prst="rect">
             <a:avLst/>
@@ -3484,7 +3527,7 @@
         <p:spPr>
           <a:xfrm>
             <a:off x="674640" y="1400040"/>
-            <a:ext cx="3863880" cy="2127600"/>
+            <a:ext cx="1884960" cy="2127600"/>
           </a:xfrm>
           <a:prstGeom prst="rect">
             <a:avLst/>
@@ -3510,7 +3553,7 @@
         <p:spPr>
           <a:xfrm>
             <a:off x="674640" y="3730320"/>
-            <a:ext cx="3863880" cy="2127600"/>
+            <a:ext cx="1884960" cy="2127600"/>
           </a:xfrm>
           <a:prstGeom prst="rect">
             <a:avLst/>
@@ -3558,7 +3601,7 @@
         <p:spPr>
           <a:xfrm>
             <a:off x="610920" y="165960"/>
-            <a:ext cx="7917840" cy="956160"/>
+            <a:ext cx="7917480" cy="956160"/>
           </a:xfrm>
           <a:prstGeom prst="rect">
             <a:avLst/>
@@ -3585,7 +3628,7 @@
         <p:spPr>
           <a:xfrm>
             <a:off x="674640" y="1400040"/>
-            <a:ext cx="1885320" cy="2127600"/>
+            <a:ext cx="919800" cy="2127600"/>
           </a:xfrm>
           <a:prstGeom prst="rect">
             <a:avLst/>
@@ -3610,8 +3653,8 @@
         </p:nvSpPr>
         <p:spPr>
           <a:xfrm>
-            <a:off x="2654640" y="1400040"/>
-            <a:ext cx="1885320" cy="2127600"/>
+            <a:off x="1640880" y="1400040"/>
+            <a:ext cx="919800" cy="2127600"/>
           </a:xfrm>
           <a:prstGeom prst="rect">
             <a:avLst/>
@@ -3636,8 +3679,8 @@
         </p:nvSpPr>
         <p:spPr>
           <a:xfrm>
-            <a:off x="2654640" y="3730320"/>
-            <a:ext cx="1885320" cy="2127600"/>
+            <a:off x="1640880" y="3730320"/>
+            <a:ext cx="919800" cy="2127600"/>
           </a:xfrm>
           <a:prstGeom prst="rect">
             <a:avLst/>
@@ -3663,7 +3706,7 @@
         <p:spPr>
           <a:xfrm>
             <a:off x="674640" y="3730320"/>
-            <a:ext cx="1885320" cy="2127600"/>
+            <a:ext cx="919800" cy="2127600"/>
           </a:xfrm>
           <a:prstGeom prst="rect">
             <a:avLst/>
@@ -3711,7 +3754,7 @@
         <p:spPr>
           <a:xfrm>
             <a:off x="610920" y="165960"/>
-            <a:ext cx="7917840" cy="956160"/>
+            <a:ext cx="7917480" cy="956160"/>
           </a:xfrm>
           <a:prstGeom prst="rect">
             <a:avLst/>
@@ -3738,7 +3781,7 @@
         <p:spPr>
           <a:xfrm>
             <a:off x="674640" y="1400040"/>
-            <a:ext cx="3863880" cy="4460760"/>
+            <a:ext cx="1884960" cy="4460400"/>
           </a:xfrm>
           <a:prstGeom prst="rect">
             <a:avLst/>
@@ -3764,7 +3807,7 @@
         <p:spPr>
           <a:xfrm>
             <a:off x="674640" y="1400040"/>
-            <a:ext cx="3863880" cy="4460760"/>
+            <a:ext cx="1884960" cy="4460400"/>
           </a:xfrm>
           <a:prstGeom prst="rect">
             <a:avLst/>
@@ -3791,8 +3834,8 @@
         </p:blipFill>
         <p:spPr>
           <a:xfrm>
-            <a:off x="674280" y="2088720"/>
-            <a:ext cx="3863880" cy="3082680"/>
+            <a:off x="674640" y="2878200"/>
+            <a:ext cx="1884960" cy="1503720"/>
           </a:xfrm>
           <a:prstGeom prst="rect">
             <a:avLst/>
@@ -3816,8 +3859,8 @@
         </p:blipFill>
         <p:spPr>
           <a:xfrm>
-            <a:off x="674280" y="2088720"/>
-            <a:ext cx="3863880" cy="3082680"/>
+            <a:off x="674640" y="2878200"/>
+            <a:ext cx="1884960" cy="1503720"/>
           </a:xfrm>
           <a:prstGeom prst="rect">
             <a:avLst/>
@@ -3862,7 +3905,7 @@
         <p:spPr>
           <a:xfrm>
             <a:off x="610920" y="165960"/>
-            <a:ext cx="7917840" cy="956160"/>
+            <a:ext cx="7917480" cy="956160"/>
           </a:xfrm>
           <a:prstGeom prst="rect">
             <a:avLst/>
@@ -3889,7 +3932,7 @@
         <p:spPr>
           <a:xfrm>
             <a:off x="674640" y="1400040"/>
-            <a:ext cx="1885320" cy="4460760"/>
+            <a:ext cx="919800" cy="4460400"/>
           </a:xfrm>
           <a:prstGeom prst="rect">
             <a:avLst/>
@@ -3914,8 +3957,8 @@
         </p:nvSpPr>
         <p:spPr>
           <a:xfrm>
-            <a:off x="2654640" y="1400040"/>
-            <a:ext cx="1885320" cy="4460760"/>
+            <a:off x="1640880" y="1400040"/>
+            <a:ext cx="919800" cy="4460400"/>
           </a:xfrm>
           <a:prstGeom prst="rect">
             <a:avLst/>
@@ -3963,7 +4006,7 @@
         <p:spPr>
           <a:xfrm>
             <a:off x="610920" y="165960"/>
-            <a:ext cx="7917840" cy="956160"/>
+            <a:ext cx="7917480" cy="956160"/>
           </a:xfrm>
           <a:prstGeom prst="rect">
             <a:avLst/>
@@ -4012,7 +4055,7 @@
         <p:spPr>
           <a:xfrm>
             <a:off x="610920" y="165960"/>
-            <a:ext cx="7917840" cy="4432320"/>
+            <a:ext cx="7917480" cy="4432320"/>
           </a:xfrm>
           <a:prstGeom prst="rect">
             <a:avLst/>
@@ -4061,7 +4104,7 @@
         <p:spPr>
           <a:xfrm>
             <a:off x="610920" y="165960"/>
-            <a:ext cx="7917840" cy="956160"/>
+            <a:ext cx="7917480" cy="956160"/>
           </a:xfrm>
           <a:prstGeom prst="rect">
             <a:avLst/>
@@ -4088,7 +4131,7 @@
         <p:spPr>
           <a:xfrm>
             <a:off x="674640" y="1400040"/>
-            <a:ext cx="1885320" cy="2127600"/>
+            <a:ext cx="919800" cy="2127600"/>
           </a:xfrm>
           <a:prstGeom prst="rect">
             <a:avLst/>
@@ -4114,7 +4157,7 @@
         <p:spPr>
           <a:xfrm>
             <a:off x="674640" y="3730320"/>
-            <a:ext cx="1885320" cy="2127600"/>
+            <a:ext cx="919800" cy="2127600"/>
           </a:xfrm>
           <a:prstGeom prst="rect">
             <a:avLst/>
@@ -4139,8 +4182,8 @@
         </p:nvSpPr>
         <p:spPr>
           <a:xfrm>
-            <a:off x="2654640" y="1400040"/>
-            <a:ext cx="1885320" cy="4460760"/>
+            <a:off x="1640880" y="1400040"/>
+            <a:ext cx="919800" cy="4460400"/>
           </a:xfrm>
           <a:prstGeom prst="rect">
             <a:avLst/>
@@ -4188,7 +4231,7 @@
         <p:spPr>
           <a:xfrm>
             <a:off x="610920" y="165960"/>
-            <a:ext cx="7917840" cy="956160"/>
+            <a:ext cx="7917480" cy="956160"/>
           </a:xfrm>
           <a:prstGeom prst="rect">
             <a:avLst/>
@@ -4215,7 +4258,7 @@
         <p:spPr>
           <a:xfrm>
             <a:off x="674640" y="1400040"/>
-            <a:ext cx="1885320" cy="4460760"/>
+            <a:ext cx="919800" cy="4460400"/>
           </a:xfrm>
           <a:prstGeom prst="rect">
             <a:avLst/>
@@ -4240,8 +4283,8 @@
         </p:nvSpPr>
         <p:spPr>
           <a:xfrm>
-            <a:off x="2654640" y="1400040"/>
-            <a:ext cx="1885320" cy="2127600"/>
+            <a:off x="1640880" y="1400040"/>
+            <a:ext cx="919800" cy="2127600"/>
           </a:xfrm>
           <a:prstGeom prst="rect">
             <a:avLst/>
@@ -4266,8 +4309,8 @@
         </p:nvSpPr>
         <p:spPr>
           <a:xfrm>
-            <a:off x="2654640" y="3730320"/>
-            <a:ext cx="1885320" cy="2127600"/>
+            <a:off x="1640880" y="3730320"/>
+            <a:ext cx="919800" cy="2127600"/>
           </a:xfrm>
           <a:prstGeom prst="rect">
             <a:avLst/>
@@ -4315,7 +4358,7 @@
         <p:spPr>
           <a:xfrm>
             <a:off x="610920" y="165960"/>
-            <a:ext cx="7917840" cy="956160"/>
+            <a:ext cx="7917480" cy="956160"/>
           </a:xfrm>
           <a:prstGeom prst="rect">
             <a:avLst/>
@@ -4342,7 +4385,7 @@
         <p:spPr>
           <a:xfrm>
             <a:off x="674640" y="1400040"/>
-            <a:ext cx="1885320" cy="2127600"/>
+            <a:ext cx="919800" cy="2127600"/>
           </a:xfrm>
           <a:prstGeom prst="rect">
             <a:avLst/>
@@ -4367,8 +4410,8 @@
         </p:nvSpPr>
         <p:spPr>
           <a:xfrm>
-            <a:off x="2654640" y="1400040"/>
-            <a:ext cx="1885320" cy="2127600"/>
+            <a:off x="1640880" y="1400040"/>
+            <a:ext cx="919800" cy="2127600"/>
           </a:xfrm>
           <a:prstGeom prst="rect">
             <a:avLst/>
@@ -4394,7 +4437,7 @@
         <p:spPr>
           <a:xfrm>
             <a:off x="674640" y="3730320"/>
-            <a:ext cx="3863880" cy="2127600"/>
+            <a:ext cx="1884960" cy="2127600"/>
           </a:xfrm>
           <a:prstGeom prst="rect">
             <a:avLst/>
@@ -4445,7 +4488,7 @@
         <p:spPr>
           <a:xfrm>
             <a:off x="290520" y="2546280"/>
-            <a:ext cx="434520" cy="471240"/>
+            <a:ext cx="434160" cy="470880"/>
           </a:xfrm>
           <a:prstGeom prst="rect">
             <a:avLst/>
@@ -4467,7 +4510,7 @@
         <p:spPr>
           <a:xfrm>
             <a:off x="673200" y="2546280"/>
-            <a:ext cx="325080" cy="471240"/>
+            <a:ext cx="324720" cy="470880"/>
           </a:xfrm>
           <a:prstGeom prst="rect">
             <a:avLst/>
@@ -4497,7 +4540,7 @@
         <p:spPr>
           <a:xfrm>
             <a:off x="414360" y="2968560"/>
-            <a:ext cx="421200" cy="471240"/>
+            <a:ext cx="420840" cy="470880"/>
           </a:xfrm>
           <a:prstGeom prst="rect">
             <a:avLst/>
@@ -4519,7 +4562,7 @@
         <p:spPr>
           <a:xfrm>
             <a:off x="783360" y="2968560"/>
-            <a:ext cx="365400" cy="471240"/>
+            <a:ext cx="365040" cy="470880"/>
           </a:xfrm>
           <a:prstGeom prst="rect">
             <a:avLst/>
@@ -4549,7 +4592,7 @@
         <p:spPr>
           <a:xfrm>
             <a:off x="0" y="2895480"/>
-            <a:ext cx="556920" cy="419040"/>
+            <a:ext cx="556560" cy="418680"/>
           </a:xfrm>
           <a:prstGeom prst="rect">
             <a:avLst/>
@@ -4579,7 +4622,7 @@
         <p:spPr>
           <a:xfrm>
             <a:off x="635040" y="2438280"/>
-            <a:ext cx="28080" cy="1049040"/>
+            <a:ext cx="27720" cy="1048680"/>
           </a:xfrm>
           <a:prstGeom prst="rect">
             <a:avLst/>
@@ -4600,8 +4643,8 @@
         </p:nvSpPr>
         <p:spPr>
           <a:xfrm flipV="1">
-            <a:off x="316080" y="3259440"/>
-            <a:ext cx="8689320" cy="51840"/>
+            <a:off x="316080" y="3258360"/>
+            <a:ext cx="8688960" cy="51480"/>
           </a:xfrm>
           <a:prstGeom prst="rect">
             <a:avLst/>
@@ -4635,14 +4678,14 @@
         <p:spPr>
           <a:xfrm>
             <a:off x="610920" y="165960"/>
-            <a:ext cx="7917840" cy="955800"/>
-          </a:xfrm>
-          <a:prstGeom prst="rect">
-            <a:avLst/>
-          </a:prstGeom>
-        </p:spPr>
-        <p:txBody>
-          <a:bodyPr lIns="90000" rIns="90000" tIns="46800" bIns="46800" anchor="b"/>
+            <a:ext cx="7917480" cy="955800"/>
+          </a:xfrm>
+          <a:prstGeom prst="rect">
+            <a:avLst/>
+          </a:prstGeom>
+        </p:spPr>
+        <p:txBody>
+          <a:bodyPr lIns="0" rIns="0" tIns="0" bIns="0" anchor="ctr"/>
           <a:p>
             <a:r>
               <a:rPr lang="en-US">
@@ -4666,8 +4709,8 @@
         </p:nvSpPr>
         <p:spPr>
           <a:xfrm>
-            <a:off x="457200" y="1604520"/>
-            <a:ext cx="8229240" cy="3977280"/>
+            <a:off x="674640" y="1400040"/>
+            <a:ext cx="3863520" cy="4460400"/>
           </a:xfrm>
           <a:prstGeom prst="rect">
             <a:avLst/>
@@ -4682,7 +4725,7 @@
               <a:buChar char=""/>
             </a:pPr>
             <a:r>
-              <a:rPr lang="en-US" sz="3200">
+              <a:rPr lang="en-US">
                 <a:latin typeface="Arial"/>
               </a:rPr>
               <a:t>Click to edit the outline text format</a:t>
@@ -4696,7 +4739,7 @@
               <a:buChar char=""/>
             </a:pPr>
             <a:r>
-              <a:rPr lang="en-US" sz="2800">
+              <a:rPr lang="en-US">
                 <a:latin typeface="Arial"/>
               </a:rPr>
               <a:t>Second Outline Level</a:t>
@@ -4710,7 +4753,7 @@
               <a:buChar char=""/>
             </a:pPr>
             <a:r>
-              <a:rPr lang="en-US" sz="2400">
+              <a:rPr lang="en-US">
                 <a:latin typeface="Arial"/>
               </a:rPr>
               <a:t>Third Outline Level</a:t>
@@ -4724,7 +4767,7 @@
               <a:buChar char=""/>
             </a:pPr>
             <a:r>
-              <a:rPr lang="en-US" sz="2000">
+              <a:rPr lang="en-US">
                 <a:latin typeface="Arial"/>
               </a:rPr>
               <a:t>Fourth Outline Level</a:t>
@@ -4738,7 +4781,7 @@
               <a:buChar char=""/>
             </a:pPr>
             <a:r>
-              <a:rPr lang="en-US" sz="2000">
+              <a:rPr lang="en-US">
                 <a:latin typeface="Arial"/>
               </a:rPr>
               <a:t>Fifth Outline Level</a:t>
@@ -4752,7 +4795,7 @@
               <a:buChar char=""/>
             </a:pPr>
             <a:r>
-              <a:rPr lang="en-US" sz="2000">
+              <a:rPr lang="en-US">
                 <a:latin typeface="Arial"/>
               </a:rPr>
               <a:t>Sixth Outline Level</a:t>
@@ -4766,7 +4809,7 @@
               <a:buChar char=""/>
             </a:pPr>
             <a:r>
-              <a:rPr lang="en-US" sz="2000">
+              <a:rPr lang="en-US">
                 <a:latin typeface="Arial"/>
               </a:rPr>
               <a:t>Seventh Outline Level</a:t>
@@ -4828,7 +4871,7 @@
         <p:spPr>
           <a:xfrm>
             <a:off x="341280" y="615960"/>
-            <a:ext cx="431640" cy="474120"/>
+            <a:ext cx="431280" cy="473760"/>
           </a:xfrm>
           <a:prstGeom prst="rect">
             <a:avLst/>
@@ -4858,7 +4901,7 @@
         <p:spPr>
           <a:xfrm>
             <a:off x="358920" y="1039680"/>
-            <a:ext cx="414000" cy="474480"/>
+            <a:ext cx="413640" cy="474120"/>
           </a:xfrm>
           <a:prstGeom prst="rect">
             <a:avLst/>
@@ -4888,7 +4931,7 @@
         <p:spPr>
           <a:xfrm>
             <a:off x="196920" y="903240"/>
-            <a:ext cx="412200" cy="421920"/>
+            <a:ext cx="411840" cy="421560"/>
           </a:xfrm>
           <a:prstGeom prst="rect">
             <a:avLst/>
@@ -4918,7 +4961,7 @@
         <p:spPr>
           <a:xfrm>
             <a:off x="507960" y="368280"/>
-            <a:ext cx="28080" cy="1049040"/>
+            <a:ext cx="27720" cy="1048680"/>
           </a:xfrm>
           <a:prstGeom prst="rect">
             <a:avLst/>
@@ -4940,7 +4983,7 @@
         <p:spPr>
           <a:xfrm>
             <a:off x="189000" y="1158840"/>
-            <a:ext cx="8222760" cy="28080"/>
+            <a:ext cx="8222400" cy="27720"/>
           </a:xfrm>
           <a:prstGeom prst="rect">
             <a:avLst/>
@@ -4973,18 +5016,19 @@
         </p:nvSpPr>
         <p:spPr>
           <a:xfrm>
-            <a:off x="610920" y="165960"/>
-            <a:ext cx="7917840" cy="955800"/>
-          </a:xfrm>
-          <a:prstGeom prst="rect">
-            <a:avLst/>
-          </a:prstGeom>
-        </p:spPr>
-        <p:txBody>
-          <a:bodyPr lIns="90000" rIns="90000" tIns="46800" bIns="46800" anchor="b"/>
-          <a:p>
-            <a:r>
-              <a:rPr lang="en-US">
+            <a:off x="457200" y="273600"/>
+            <a:ext cx="8229240" cy="1144800"/>
+          </a:xfrm>
+          <a:prstGeom prst="rect">
+            <a:avLst/>
+          </a:prstGeom>
+        </p:spPr>
+        <p:txBody>
+          <a:bodyPr lIns="0" rIns="0" tIns="0" bIns="0" anchor="ctr"/>
+          <a:p>
+            <a:pPr algn="ctr"/>
+            <a:r>
+              <a:rPr lang="en-US" sz="4400">
                 <a:latin typeface="Arial"/>
               </a:rPr>
               <a:t>Click to edit the title text format</a:t>
@@ -5005,15 +5049,15 @@
         </p:nvSpPr>
         <p:spPr>
           <a:xfrm>
-            <a:off x="674640" y="1400040"/>
-            <a:ext cx="7918200" cy="4460760"/>
-          </a:xfrm>
-          <a:prstGeom prst="rect">
-            <a:avLst/>
-          </a:prstGeom>
-        </p:spPr>
-        <p:txBody>
-          <a:bodyPr lIns="90000" rIns="90000" tIns="46800" bIns="46800"/>
+            <a:off x="457200" y="1604520"/>
+            <a:ext cx="8229240" cy="3977280"/>
+          </a:xfrm>
+          <a:prstGeom prst="rect">
+            <a:avLst/>
+          </a:prstGeom>
+        </p:spPr>
+        <p:txBody>
+          <a:bodyPr lIns="0" rIns="0" tIns="0" bIns="0"/>
           <a:p>
             <a:pPr>
               <a:buSzPct val="45000"/>
@@ -5021,7 +5065,7 @@
               <a:buChar char=""/>
             </a:pPr>
             <a:r>
-              <a:rPr lang="en-US">
+              <a:rPr lang="en-US" sz="3200">
                 <a:latin typeface="Arial"/>
               </a:rPr>
               <a:t>Click to edit the outline text format</a:t>
@@ -5035,7 +5079,7 @@
               <a:buChar char=""/>
             </a:pPr>
             <a:r>
-              <a:rPr lang="en-US">
+              <a:rPr lang="en-US" sz="2800">
                 <a:latin typeface="Arial"/>
               </a:rPr>
               <a:t>Second Outline Level</a:t>
@@ -5049,7 +5093,7 @@
               <a:buChar char=""/>
             </a:pPr>
             <a:r>
-              <a:rPr lang="en-US">
+              <a:rPr lang="en-US" sz="2400">
                 <a:latin typeface="Arial"/>
               </a:rPr>
               <a:t>Third Outline Level</a:t>
@@ -5063,7 +5107,7 @@
               <a:buChar char=""/>
             </a:pPr>
             <a:r>
-              <a:rPr lang="en-US">
+              <a:rPr lang="en-US" sz="2000">
                 <a:latin typeface="Arial"/>
               </a:rPr>
               <a:t>Fourth Outline Level</a:t>
@@ -5077,7 +5121,7 @@
               <a:buChar char=""/>
             </a:pPr>
             <a:r>
-              <a:rPr lang="en-US">
+              <a:rPr lang="en-US" sz="2000">
                 <a:latin typeface="Arial"/>
               </a:rPr>
               <a:t>Fifth Outline Level</a:t>
@@ -5091,7 +5135,7 @@
               <a:buChar char=""/>
             </a:pPr>
             <a:r>
-              <a:rPr lang="en-US">
+              <a:rPr lang="en-US" sz="2000">
                 <a:latin typeface="Arial"/>
               </a:rPr>
               <a:t>Sixth Outline Level</a:t>
@@ -5105,7 +5149,7 @@
               <a:buChar char=""/>
             </a:pPr>
             <a:r>
-              <a:rPr lang="en-US">
+              <a:rPr lang="en-US" sz="2000">
                 <a:latin typeface="Arial"/>
               </a:rPr>
               <a:t>Seventh Outline Level</a:t>
@@ -5167,7 +5211,7 @@
         <p:spPr>
           <a:xfrm>
             <a:off x="341280" y="615960"/>
-            <a:ext cx="431640" cy="474120"/>
+            <a:ext cx="431280" cy="473760"/>
           </a:xfrm>
           <a:prstGeom prst="rect">
             <a:avLst/>
@@ -5197,7 +5241,7 @@
         <p:spPr>
           <a:xfrm>
             <a:off x="358920" y="1039680"/>
-            <a:ext cx="414000" cy="474480"/>
+            <a:ext cx="413640" cy="474120"/>
           </a:xfrm>
           <a:prstGeom prst="rect">
             <a:avLst/>
@@ -5227,7 +5271,7 @@
         <p:spPr>
           <a:xfrm>
             <a:off x="196920" y="903240"/>
-            <a:ext cx="412200" cy="421920"/>
+            <a:ext cx="411840" cy="421560"/>
           </a:xfrm>
           <a:prstGeom prst="rect">
             <a:avLst/>
@@ -5257,7 +5301,7 @@
         <p:spPr>
           <a:xfrm>
             <a:off x="507960" y="368280"/>
-            <a:ext cx="28080" cy="1049040"/>
+            <a:ext cx="27720" cy="1048680"/>
           </a:xfrm>
           <a:prstGeom prst="rect">
             <a:avLst/>
@@ -5279,7 +5323,7 @@
         <p:spPr>
           <a:xfrm>
             <a:off x="189000" y="1158840"/>
-            <a:ext cx="8222760" cy="28080"/>
+            <a:ext cx="8222400" cy="27720"/>
           </a:xfrm>
           <a:prstGeom prst="rect">
             <a:avLst/>
@@ -5313,14 +5357,14 @@
         <p:spPr>
           <a:xfrm>
             <a:off x="610920" y="165960"/>
-            <a:ext cx="7917840" cy="955800"/>
-          </a:xfrm>
-          <a:prstGeom prst="rect">
-            <a:avLst/>
-          </a:prstGeom>
-        </p:spPr>
-        <p:txBody>
-          <a:bodyPr lIns="90000" rIns="90000" tIns="46800" bIns="46800" anchor="b"/>
+            <a:ext cx="7917480" cy="955800"/>
+          </a:xfrm>
+          <a:prstGeom prst="rect">
+            <a:avLst/>
+          </a:prstGeom>
+        </p:spPr>
+        <p:txBody>
+          <a:bodyPr lIns="0" rIns="0" tIns="0" bIns="0" anchor="ctr"/>
           <a:p>
             <a:r>
               <a:rPr lang="en-US">
@@ -5345,14 +5389,14 @@
         <p:spPr>
           <a:xfrm>
             <a:off x="674640" y="1400040"/>
-            <a:ext cx="3863880" cy="4460760"/>
-          </a:xfrm>
-          <a:prstGeom prst="rect">
-            <a:avLst/>
-          </a:prstGeom>
-        </p:spPr>
-        <p:txBody>
-          <a:bodyPr lIns="90000" rIns="90000" tIns="46800" bIns="46800"/>
+            <a:ext cx="1884960" cy="4460400"/>
+          </a:xfrm>
+          <a:prstGeom prst="rect">
+            <a:avLst/>
+          </a:prstGeom>
+        </p:spPr>
+        <p:txBody>
+          <a:bodyPr lIns="0" rIns="0" tIns="0" bIns="0"/>
           <a:p>
             <a:pPr>
               <a:buSzPct val="45000"/>
@@ -5465,15 +5509,15 @@
         </p:nvSpPr>
         <p:spPr>
           <a:xfrm>
-            <a:off x="4732560" y="1400040"/>
-            <a:ext cx="3863880" cy="4460760"/>
-          </a:xfrm>
-          <a:prstGeom prst="rect">
-            <a:avLst/>
-          </a:prstGeom>
-        </p:spPr>
-        <p:txBody>
-          <a:bodyPr lIns="90000" rIns="90000" tIns="46800" bIns="46800"/>
+            <a:off x="2654640" y="1400040"/>
+            <a:ext cx="1884960" cy="4460400"/>
+          </a:xfrm>
+          <a:prstGeom prst="rect">
+            <a:avLst/>
+          </a:prstGeom>
+        </p:spPr>
+        <p:txBody>
+          <a:bodyPr lIns="0" rIns="0" tIns="0" bIns="0"/>
           <a:p>
             <a:pPr>
               <a:buSzPct val="45000"/>
@@ -5627,7 +5671,7 @@
         <p:spPr>
           <a:xfrm>
             <a:off x="838080" y="1676160"/>
-            <a:ext cx="7467480" cy="1461600"/>
+            <a:ext cx="7467120" cy="1461240"/>
           </a:xfrm>
           <a:prstGeom prst="rect">
             <a:avLst/>
@@ -5667,7 +5711,7 @@
         <p:spPr>
           <a:xfrm>
             <a:off x="1371600" y="3886200"/>
-            <a:ext cx="6400440" cy="1752120"/>
+            <a:ext cx="6400080" cy="1751760"/>
           </a:xfrm>
           <a:prstGeom prst="rect">
             <a:avLst/>
@@ -5760,7 +5804,7 @@
         <p:spPr>
           <a:xfrm>
             <a:off x="611280" y="259920"/>
-            <a:ext cx="7921080" cy="864720"/>
+            <a:ext cx="7920720" cy="864360"/>
           </a:xfrm>
           <a:prstGeom prst="rect">
             <a:avLst/>
@@ -5797,7 +5841,7 @@
         <p:spPr>
           <a:xfrm>
             <a:off x="611280" y="1447920"/>
-            <a:ext cx="7921080" cy="746280"/>
+            <a:ext cx="7920720" cy="745920"/>
           </a:xfrm>
           <a:prstGeom prst="rect">
             <a:avLst/>
@@ -5844,7 +5888,7 @@
         <p:spPr>
           <a:xfrm>
             <a:off x="611280" y="1447920"/>
-            <a:ext cx="7924680" cy="4882680"/>
+            <a:ext cx="7924320" cy="4882320"/>
           </a:xfrm>
           <a:prstGeom prst="rect">
             <a:avLst/>
@@ -6084,7 +6128,21 @@
                 <a:latin typeface="Courier New"/>
                 <a:ea typeface="Arial"/>
               </a:rPr>
-              <a:t>if (! running) return;</a:t>
+              <a:t>if (! </a:t>
+            </a:r>
+            <a:r>
+              <a:rPr b="1" lang="en-US" sz="2200">
+                <a:latin typeface="Courier New"/>
+                <a:ea typeface="Arial"/>
+              </a:rPr>
+              <a:t>running </a:t>
+            </a:r>
+            <a:r>
+              <a:rPr lang="en-US" sz="2200">
+                <a:latin typeface="Courier New"/>
+                <a:ea typeface="Arial"/>
+              </a:rPr>
+              <a:t>) return;</a:t>
             </a:r>
             <a:endParaRPr/>
           </a:p>
@@ -6214,7 +6272,7 @@
         <p:spPr>
           <a:xfrm>
             <a:off x="611280" y="259920"/>
-            <a:ext cx="7921080" cy="864720"/>
+            <a:ext cx="7920720" cy="864360"/>
           </a:xfrm>
           <a:prstGeom prst="rect">
             <a:avLst/>
@@ -6251,7 +6309,7 @@
         <p:spPr>
           <a:xfrm>
             <a:off x="762120" y="1371600"/>
-            <a:ext cx="7619400" cy="4754520"/>
+            <a:ext cx="7619040" cy="4754160"/>
           </a:xfrm>
           <a:prstGeom prst="rect">
             <a:avLst/>
@@ -6318,7 +6376,7 @@
                 <a:latin typeface="Arial"/>
                 <a:ea typeface="Arial"/>
               </a:rPr>
-              <a:t>For more states we need another type of state var.</a:t>
+              <a:t>For more states we need another type of state variable.</a:t>
             </a:r>
             <a:endParaRPr/>
           </a:p>
@@ -6457,7 +6515,7 @@
         <p:spPr>
           <a:xfrm>
             <a:off x="610920" y="259920"/>
-            <a:ext cx="7917840" cy="861840"/>
+            <a:ext cx="7917480" cy="861480"/>
           </a:xfrm>
           <a:prstGeom prst="rect">
             <a:avLst/>
@@ -6489,7 +6547,7 @@
         <p:spPr>
           <a:xfrm>
             <a:off x="674640" y="1400040"/>
-            <a:ext cx="3863880" cy="4460760"/>
+            <a:ext cx="3863520" cy="4460400"/>
           </a:xfrm>
           <a:prstGeom prst="rect">
             <a:avLst/>
@@ -6702,7 +6760,7 @@
         <p:spPr>
           <a:xfrm>
             <a:off x="4732560" y="1400040"/>
-            <a:ext cx="3863880" cy="4460760"/>
+            <a:ext cx="3863520" cy="4460400"/>
           </a:xfrm>
           <a:prstGeom prst="rect">
             <a:avLst/>
@@ -6852,7 +6910,7 @@
             <a:r>
               <a:rPr lang="en-US" sz="2400">
                 <a:solidFill>
-                  <a:srgbClr val="ff0000"/>
+                  <a:srgbClr val="000080"/>
                 </a:solidFill>
                 <a:latin typeface="Arial"/>
               </a:rPr>
@@ -7005,7 +7063,7 @@
         <p:spPr>
           <a:xfrm>
             <a:off x="611280" y="259920"/>
-            <a:ext cx="7921080" cy="864720"/>
+            <a:ext cx="7920720" cy="864360"/>
           </a:xfrm>
           <a:prstGeom prst="rect">
             <a:avLst/>
@@ -7042,7 +7100,7 @@
         <p:spPr>
           <a:xfrm>
             <a:off x="731520" y="1371600"/>
-            <a:ext cx="7619400" cy="1828440"/>
+            <a:ext cx="7619040" cy="1828080"/>
           </a:xfrm>
           <a:prstGeom prst="rect">
             <a:avLst/>
@@ -7143,7 +7201,7 @@
         <p:spPr>
           <a:xfrm>
             <a:off x="1431000" y="2783520"/>
-            <a:ext cx="6706800" cy="4074120"/>
+            <a:ext cx="6706440" cy="4073760"/>
           </a:xfrm>
           <a:prstGeom prst="rect">
             <a:avLst/>
@@ -7218,7 +7276,7 @@
         <p:spPr>
           <a:xfrm>
             <a:off x="611280" y="259920"/>
-            <a:ext cx="7921080" cy="864720"/>
+            <a:ext cx="7920720" cy="864360"/>
           </a:xfrm>
           <a:prstGeom prst="rect">
             <a:avLst/>
@@ -7255,7 +7313,7 @@
         <p:spPr>
           <a:xfrm>
             <a:off x="611280" y="1447920"/>
-            <a:ext cx="7921080" cy="1386360"/>
+            <a:ext cx="7920720" cy="1386000"/>
           </a:xfrm>
           <a:prstGeom prst="rect">
             <a:avLst/>
@@ -7297,7 +7355,25 @@
                 </a:solidFill>
                 <a:latin typeface="Arial"/>
               </a:rPr>
-              <a:t>Stopwatch delegates behavior to the state.</a:t>
+              <a:t>Stopwatch delegates behavior to the </a:t>
+            </a:r>
+            <a:r>
+              <a:rPr b="1" lang="en-US" sz="2400">
+                <a:solidFill>
+                  <a:srgbClr val="000080"/>
+                </a:solidFill>
+                <a:latin typeface="Courier New"/>
+              </a:rPr>
+              <a:t>state</a:t>
+            </a:r>
+            <a:r>
+              <a:rPr lang="en-US" sz="2400">
+                <a:solidFill>
+                  <a:srgbClr val="000080"/>
+                </a:solidFill>
+                <a:latin typeface="Arial"/>
+              </a:rPr>
+              <a:t>.</a:t>
             </a:r>
             <a:endParaRPr/>
           </a:p>
@@ -7312,7 +7388,7 @@
         <p:spPr>
           <a:xfrm>
             <a:off x="670320" y="2651760"/>
-            <a:ext cx="7924680" cy="3657240"/>
+            <a:ext cx="7924320" cy="3656880"/>
           </a:xfrm>
           <a:prstGeom prst="rect">
             <a:avLst/>
@@ -7376,59 +7452,71 @@
                 <a:latin typeface="Courier New"/>
                 <a:ea typeface="Arial"/>
               </a:rPr>
-              <a:t>private State state;</a:t>
-            </a:r>
-            <a:endParaRPr/>
-          </a:p>
-          <a:p>
-            <a:pPr>
-              <a:lnSpc>
-                <a:spcPct val="100000"/>
-              </a:lnSpc>
-            </a:pPr>
-            <a:endParaRPr/>
-          </a:p>
-          <a:p>
-            <a:pPr>
-              <a:lnSpc>
-                <a:spcPct val="100000"/>
-              </a:lnSpc>
-            </a:pPr>
+              <a:t>private State </a:t>
+            </a:r>
+            <a:r>
+              <a:rPr b="1" lang="en-US" sz="2200">
+                <a:solidFill>
+                  <a:srgbClr val="000080"/>
+                </a:solidFill>
+                <a:latin typeface="Courier New"/>
+                <a:ea typeface="Arial"/>
+              </a:rPr>
+              <a:t>state</a:t>
+            </a:r>
             <a:r>
               <a:rPr lang="en-US" sz="2200">
                 <a:latin typeface="Courier New"/>
                 <a:ea typeface="Arial"/>
               </a:rPr>
-              <a:t>    </a:t>
-            </a:r>
+              <a:t>;</a:t>
+            </a:r>
+            <a:endParaRPr/>
+          </a:p>
+          <a:p>
+            <a:pPr>
+              <a:lnSpc>
+                <a:spcPct val="100000"/>
+              </a:lnSpc>
+            </a:pPr>
+            <a:endParaRPr/>
+          </a:p>
+          <a:p>
+            <a:pPr>
+              <a:lnSpc>
+                <a:spcPct val="100000"/>
+              </a:lnSpc>
+            </a:pPr>
             <a:r>
               <a:rPr lang="en-US" sz="2200">
                 <a:latin typeface="Courier New"/>
                 <a:ea typeface="Arial"/>
               </a:rPr>
-              <a:t>public void start( ) { state.start(); }</a:t>
-            </a:r>
-            <a:endParaRPr/>
-          </a:p>
-          <a:p>
-            <a:pPr>
-              <a:lnSpc>
-                <a:spcPct val="100000"/>
-              </a:lnSpc>
-            </a:pPr>
+              <a:t>    </a:t>
+            </a:r>
             <a:r>
               <a:rPr lang="en-US" sz="2200">
                 <a:latin typeface="Courier New"/>
                 <a:ea typeface="Arial"/>
               </a:rPr>
-              <a:t>    </a:t>
+              <a:t>public void start( ) { </a:t>
+            </a:r>
+            <a:r>
+              <a:rPr b="1" lang="en-US" sz="2200">
+                <a:solidFill>
+                  <a:srgbClr val="000080"/>
+                </a:solidFill>
+                <a:latin typeface="Courier New"/>
+                <a:ea typeface="Arial"/>
+              </a:rPr>
+              <a:t>state</a:t>
             </a:r>
             <a:r>
               <a:rPr lang="en-US" sz="2200">
                 <a:latin typeface="Courier New"/>
                 <a:ea typeface="Arial"/>
               </a:rPr>
-              <a:t>public void stop()   { state.stop(); }</a:t>
+              <a:t>.start(); }</a:t>
             </a:r>
             <a:endParaRPr/>
           </a:p>
@@ -7450,29 +7538,85 @@
                 <a:latin typeface="Courier New"/>
                 <a:ea typeface="Arial"/>
               </a:rPr>
-              <a:t>public double getElapsed() {</a:t>
-            </a:r>
-            <a:endParaRPr/>
-          </a:p>
-          <a:p>
-            <a:pPr>
-              <a:lnSpc>
-                <a:spcPct val="100000"/>
-              </a:lnSpc>
-            </a:pPr>
+              <a:t>public void stop()   { </a:t>
+            </a:r>
+            <a:r>
+              <a:rPr b="1" lang="en-US" sz="2200">
+                <a:solidFill>
+                  <a:srgbClr val="000080"/>
+                </a:solidFill>
+                <a:latin typeface="Courier New"/>
+                <a:ea typeface="Arial"/>
+              </a:rPr>
+              <a:t>state</a:t>
+            </a:r>
             <a:r>
               <a:rPr lang="en-US" sz="2200">
                 <a:latin typeface="Courier New"/>
                 <a:ea typeface="Arial"/>
               </a:rPr>
-              <a:t>        </a:t>
-            </a:r>
+              <a:t>.stop(); }</a:t>
+            </a:r>
+            <a:endParaRPr/>
+          </a:p>
+          <a:p>
+            <a:pPr>
+              <a:lnSpc>
+                <a:spcPct val="100000"/>
+              </a:lnSpc>
+            </a:pPr>
             <a:r>
               <a:rPr lang="en-US" sz="2200">
                 <a:latin typeface="Courier New"/>
                 <a:ea typeface="Arial"/>
               </a:rPr>
-              <a:t>return state.getElapsed();</a:t>
+              <a:t>    </a:t>
+            </a:r>
+            <a:r>
+              <a:rPr lang="en-US" sz="2200">
+                <a:latin typeface="Courier New"/>
+                <a:ea typeface="Arial"/>
+              </a:rPr>
+              <a:t>public double getElapsed() {</a:t>
+            </a:r>
+            <a:endParaRPr/>
+          </a:p>
+          <a:p>
+            <a:pPr>
+              <a:lnSpc>
+                <a:spcPct val="100000"/>
+              </a:lnSpc>
+            </a:pPr>
+            <a:r>
+              <a:rPr lang="en-US" sz="2200">
+                <a:latin typeface="Courier New"/>
+                <a:ea typeface="Arial"/>
+              </a:rPr>
+              <a:t>        </a:t>
+            </a:r>
+            <a:r>
+              <a:rPr lang="en-US" sz="2200">
+                <a:latin typeface="Courier New"/>
+                <a:ea typeface="Arial"/>
+              </a:rPr>
+              <a:t>return </a:t>
+            </a:r>
+            <a:r>
+              <a:rPr b="1" lang="en-US" sz="2200">
+                <a:solidFill>
+                  <a:srgbClr val="000080"/>
+                </a:solidFill>
+                <a:latin typeface="Courier New"/>
+                <a:ea typeface="Arial"/>
+              </a:rPr>
+              <a:t>state</a:t>
+            </a:r>
+            <a:r>
+              <a:rPr lang="en-US" sz="2200">
+                <a:latin typeface="Courier New"/>
+                <a:ea typeface="Arial"/>
+              </a:rPr>
+              <a:t>.getElapsed();</a:t>
             </a:r>
             <a:endParaRPr/>
           </a:p>
@@ -7573,7 +7717,7 @@
         <p:spPr>
           <a:xfrm>
             <a:off x="611280" y="259920"/>
-            <a:ext cx="7921080" cy="864720"/>
+            <a:ext cx="7920720" cy="864360"/>
           </a:xfrm>
           <a:prstGeom prst="rect">
             <a:avLst/>
@@ -7595,7 +7739,7 @@
               <a:rPr lang="en-US" sz="3600">
                 <a:latin typeface="Arial"/>
               </a:rPr>
-              <a:t>Glue</a:t>
+              <a:t>State Objects and Changing State</a:t>
             </a:r>
             <a:endParaRPr/>
           </a:p>
@@ -7610,7 +7754,7 @@
         <p:spPr>
           <a:xfrm>
             <a:off x="611280" y="1447920"/>
-            <a:ext cx="7921080" cy="1386360"/>
+            <a:ext cx="7920720" cy="1386000"/>
           </a:xfrm>
           <a:prstGeom prst="rect">
             <a:avLst/>
@@ -7644,7 +7788,7 @@
               <a:rPr lang="en-US" sz="2400">
                 <a:latin typeface="Arial"/>
               </a:rPr>
-              <a:t>(StopWatch) needs a setState method.</a:t>
+              <a:t>(StopWatch) needs a setState method as a way of changing the state.</a:t>
             </a:r>
             <a:endParaRPr/>
           </a:p>
@@ -7709,7 +7853,7 @@
         <p:spPr>
           <a:xfrm>
             <a:off x="670320" y="2651760"/>
-            <a:ext cx="7924680" cy="3657240"/>
+            <a:ext cx="7924320" cy="3656880"/>
           </a:xfrm>
           <a:prstGeom prst="rect">
             <a:avLst/>
@@ -7734,10 +7878,51 @@
             </a:pPr>
             <a:r>
               <a:rPr lang="en-US" sz="2200">
+                <a:solidFill>
+                  <a:srgbClr val="008000"/>
+                </a:solidFill>
                 <a:latin typeface="Courier New"/>
                 <a:ea typeface="Arial"/>
               </a:rPr>
-              <a:t>public void setState(State newstate) {</a:t>
+              <a:t>// Create the states with a reference to</a:t>
+            </a:r>
+            <a:endParaRPr/>
+          </a:p>
+          <a:p>
+            <a:pPr>
+              <a:lnSpc>
+                <a:spcPct val="100000"/>
+              </a:lnSpc>
+            </a:pPr>
+            <a:r>
+              <a:rPr lang="en-US" sz="2200">
+                <a:solidFill>
+                  <a:srgbClr val="008000"/>
+                </a:solidFill>
+                <a:latin typeface="Courier New"/>
+                <a:ea typeface="Arial"/>
+              </a:rPr>
+              <a:t>// the stopwatch (the </a:t>
+            </a:r>
+            <a:r>
+              <a:rPr b="1" lang="en-US" sz="2200">
+                <a:solidFill>
+                  <a:srgbClr val="008000"/>
+                </a:solidFill>
+                <a:latin typeface="Courier New"/>
+                <a:ea typeface="Arial"/>
+              </a:rPr>
+              <a:t>context</a:t>
+            </a:r>
+            <a:r>
+              <a:rPr lang="en-US" sz="2200">
+                <a:solidFill>
+                  <a:srgbClr val="008000"/>
+                </a:solidFill>
+                <a:latin typeface="Courier New"/>
+                <a:ea typeface="Arial"/>
+              </a:rPr>
+              <a:t>)</a:t>
             </a:r>
             <a:endParaRPr/>
           </a:p>
@@ -7752,14 +7937,48 @@
                 <a:latin typeface="Courier New"/>
                 <a:ea typeface="Arial"/>
               </a:rPr>
-              <a:t>    </a:t>
-            </a:r>
+              <a:t>final State RUNNING = new RunningState(this);</a:t>
+            </a:r>
+            <a:endParaRPr/>
+          </a:p>
+          <a:p>
+            <a:pPr>
+              <a:lnSpc>
+                <a:spcPct val="100000"/>
+              </a:lnSpc>
+            </a:pPr>
             <a:r>
               <a:rPr lang="en-US" sz="2200">
                 <a:latin typeface="Courier New"/>
                 <a:ea typeface="Arial"/>
               </a:rPr>
-              <a:t>this.state = newstate;</a:t>
+              <a:t>final State STOPPED = new StoppedState(this);</a:t>
+            </a:r>
+            <a:endParaRPr/>
+          </a:p>
+          <a:p>
+            <a:pPr>
+              <a:lnSpc>
+                <a:spcPct val="100000"/>
+              </a:lnSpc>
+            </a:pPr>
+            <a:endParaRPr/>
+          </a:p>
+          <a:p>
+            <a:pPr>
+              <a:lnSpc>
+                <a:spcPct val="100000"/>
+              </a:lnSpc>
+            </a:pPr>
+            <a:r>
+              <a:rPr lang="en-US" sz="2200">
+                <a:solidFill>
+                  <a:srgbClr val="008000"/>
+                </a:solidFill>
+                <a:latin typeface="Courier New"/>
+                <a:ea typeface="Arial"/>
+              </a:rPr>
+              <a:t>// provide a method for changing the state</a:t>
             </a:r>
             <a:endParaRPr/>
           </a:p>
@@ -7774,30 +7993,21 @@
                 <a:latin typeface="Courier New"/>
                 <a:ea typeface="Arial"/>
               </a:rPr>
-              <a:t>}</a:t>
-            </a:r>
-            <a:endParaRPr/>
-          </a:p>
-          <a:p>
-            <a:pPr>
-              <a:lnSpc>
-                <a:spcPct val="100000"/>
-              </a:lnSpc>
-            </a:pPr>
-            <a:endParaRPr/>
-          </a:p>
-          <a:p>
-            <a:pPr>
-              <a:lnSpc>
-                <a:spcPct val="100000"/>
-              </a:lnSpc>
-            </a:pPr>
+              <a:t>public void </a:t>
+            </a:r>
+            <a:r>
+              <a:rPr b="1" lang="en-US" sz="2200">
+                <a:latin typeface="Courier New"/>
+                <a:ea typeface="Arial"/>
+              </a:rPr>
+              <a:t>setState</a:t>
+            </a:r>
             <a:r>
               <a:rPr lang="en-US" sz="2200">
                 <a:latin typeface="Courier New"/>
                 <a:ea typeface="Arial"/>
               </a:rPr>
-              <a:t>// create the states with a reference to</a:t>
+              <a:t>(State newstate) {</a:t>
             </a:r>
             <a:endParaRPr/>
           </a:p>
@@ -7812,22 +8022,14 @@
                 <a:latin typeface="Courier New"/>
                 <a:ea typeface="Arial"/>
               </a:rPr>
-              <a:t>// the stopwatch</a:t>
-            </a:r>
-            <a:endParaRPr/>
-          </a:p>
-          <a:p>
-            <a:pPr>
-              <a:lnSpc>
-                <a:spcPct val="100000"/>
-              </a:lnSpc>
-            </a:pPr>
+              <a:t>    </a:t>
+            </a:r>
             <a:r>
               <a:rPr lang="en-US" sz="2200">
                 <a:latin typeface="Courier New"/>
                 <a:ea typeface="Arial"/>
               </a:rPr>
-              <a:t>final State running = new RunningState(this);</a:t>
+              <a:t>this.state = newstate;</a:t>
             </a:r>
             <a:endParaRPr/>
           </a:p>
@@ -7842,8 +8044,16 @@
                 <a:latin typeface="Courier New"/>
                 <a:ea typeface="Arial"/>
               </a:rPr>
-              <a:t>final State stopped = new StoppedState(this);</a:t>
-            </a:r>
+              <a:t>}</a:t>
+            </a:r>
+            <a:endParaRPr/>
+          </a:p>
+          <a:p>
+            <a:pPr>
+              <a:lnSpc>
+                <a:spcPct val="100000"/>
+              </a:lnSpc>
+            </a:pPr>
             <a:endParaRPr/>
           </a:p>
           <a:p>
@@ -7921,7 +8131,7 @@
         <p:spPr>
           <a:xfrm>
             <a:off x="611280" y="259920"/>
-            <a:ext cx="7921080" cy="864720"/>
+            <a:ext cx="7920720" cy="864360"/>
           </a:xfrm>
           <a:prstGeom prst="rect">
             <a:avLst/>
@@ -7943,37 +8153,292 @@
               <a:rPr lang="en-US" sz="3600">
                 <a:latin typeface="Arial"/>
               </a:rPr>
-              <a:t>UML State Machine Diagram</a:t>
-            </a:r>
-            <a:endParaRPr/>
-          </a:p>
-        </p:txBody>
-      </p:sp>
-      <p:pic>
-        <p:nvPicPr>
-          <p:cNvPr id="179" name="" descr=""/>
-          <p:cNvPicPr/>
+              <a:t>Example of Changing State</a:t>
+            </a:r>
+            <a:endParaRPr/>
+          </a:p>
+        </p:txBody>
+      </p:sp>
+      <p:sp>
+        <p:nvSpPr>
+          <p:cNvPr id="179" name="CustomShape 2"/>
+          <p:cNvSpPr/>
           <p:nvPr/>
-        </p:nvPicPr>
-        <p:blipFill>
-          <a:blip r:embed="rId1"/>
-          <a:stretch>
-            <a:fillRect/>
-          </a:stretch>
-        </p:blipFill>
-        <p:spPr>
-          <a:xfrm>
-            <a:off x="182880" y="2194560"/>
-            <a:ext cx="8412480" cy="3749040"/>
-          </a:xfrm>
-          <a:prstGeom prst="rect">
-            <a:avLst/>
-          </a:prstGeom>
+        </p:nvSpPr>
+        <p:spPr>
+          <a:xfrm>
+            <a:off x="611280" y="1447920"/>
+            <a:ext cx="7920720" cy="1386000"/>
+          </a:xfrm>
+          <a:prstGeom prst="rect">
+            <a:avLst/>
+          </a:prstGeom>
+          <a:noFill/>
           <a:ln>
             <a:noFill/>
           </a:ln>
         </p:spPr>
-      </p:pic>
+        <p:txBody>
+          <a:bodyPr lIns="90000" rIns="90000" tIns="46800" bIns="46800"/>
+          <a:p>
+            <a:pPr>
+              <a:lnSpc>
+                <a:spcPct val="100000"/>
+              </a:lnSpc>
+            </a:pPr>
+            <a:r>
+              <a:rPr lang="en-US" sz="2400">
+                <a:latin typeface="Arial"/>
+              </a:rPr>
+              <a:t>If the stopwatch is running and the Stop button is pressed, then change to stopped state...</a:t>
+            </a:r>
+            <a:endParaRPr/>
+          </a:p>
+        </p:txBody>
+      </p:sp>
+      <p:sp>
+        <p:nvSpPr>
+          <p:cNvPr id="180" name="CustomShape 3"/>
+          <p:cNvSpPr/>
+          <p:nvPr/>
+        </p:nvSpPr>
+        <p:spPr>
+          <a:xfrm>
+            <a:off x="670320" y="2468880"/>
+            <a:ext cx="7924320" cy="3840480"/>
+          </a:xfrm>
+          <a:prstGeom prst="rect">
+            <a:avLst/>
+          </a:prstGeom>
+          <a:solidFill>
+            <a:srgbClr val="ffffcc"/>
+          </a:solidFill>
+          <a:ln w="9360">
+            <a:solidFill>
+              <a:srgbClr val="333399"/>
+            </a:solidFill>
+            <a:miter/>
+          </a:ln>
+        </p:spPr>
+        <p:txBody>
+          <a:bodyPr lIns="90000" rIns="90000" tIns="46800" bIns="46800"/>
+          <a:p>
+            <a:pPr>
+              <a:lnSpc>
+                <a:spcPct val="100000"/>
+              </a:lnSpc>
+            </a:pPr>
+            <a:r>
+              <a:rPr lang="en-US" sz="2200">
+                <a:solidFill>
+                  <a:srgbClr val="000000"/>
+                </a:solidFill>
+                <a:latin typeface="Courier New"/>
+              </a:rPr>
+              <a:t>class RunningState implements State {</a:t>
+            </a:r>
+            <a:endParaRPr/>
+          </a:p>
+          <a:p>
+            <a:pPr>
+              <a:lnSpc>
+                <a:spcPct val="100000"/>
+              </a:lnSpc>
+            </a:pPr>
+            <a:r>
+              <a:rPr lang="en-US" sz="2200">
+                <a:solidFill>
+                  <a:srgbClr val="000000"/>
+                </a:solidFill>
+                <a:latin typeface="Courier New"/>
+                <a:ea typeface="Arial"/>
+              </a:rPr>
+              <a:t>   </a:t>
+            </a:r>
+            <a:r>
+              <a:rPr lang="en-US" sz="2200">
+                <a:solidFill>
+                  <a:srgbClr val="000000"/>
+                </a:solidFill>
+                <a:latin typeface="Courier New"/>
+                <a:ea typeface="Arial"/>
+              </a:rPr>
+              <a:t>private StopWatch context;</a:t>
+            </a:r>
+            <a:endParaRPr/>
+          </a:p>
+          <a:p>
+            <a:pPr>
+              <a:lnSpc>
+                <a:spcPct val="100000"/>
+              </a:lnSpc>
+            </a:pPr>
+            <a:endParaRPr/>
+          </a:p>
+          <a:p>
+            <a:pPr>
+              <a:lnSpc>
+                <a:spcPct val="100000"/>
+              </a:lnSpc>
+            </a:pPr>
+            <a:r>
+              <a:rPr lang="en-US" sz="2200">
+                <a:latin typeface="Courier New"/>
+                <a:ea typeface="Arial"/>
+              </a:rPr>
+              <a:t>   </a:t>
+            </a:r>
+            <a:r>
+              <a:rPr lang="en-US" sz="2200">
+                <a:latin typeface="Courier New"/>
+                <a:ea typeface="Arial"/>
+              </a:rPr>
+              <a:t>public void stop() {</a:t>
+            </a:r>
+            <a:endParaRPr/>
+          </a:p>
+          <a:p>
+            <a:pPr>
+              <a:lnSpc>
+                <a:spcPct val="100000"/>
+              </a:lnSpc>
+            </a:pPr>
+            <a:r>
+              <a:rPr lang="en-US" sz="2200">
+                <a:latin typeface="Courier New"/>
+                <a:ea typeface="Arial"/>
+              </a:rPr>
+              <a:t>      </a:t>
+            </a:r>
+            <a:r>
+              <a:rPr lang="en-US" sz="2200">
+                <a:latin typeface="Courier New"/>
+                <a:ea typeface="Arial"/>
+              </a:rPr>
+              <a:t>context.stopTime = System.nanoTime();</a:t>
+            </a:r>
+            <a:endParaRPr/>
+          </a:p>
+          <a:p>
+            <a:pPr>
+              <a:lnSpc>
+                <a:spcPct val="100000"/>
+              </a:lnSpc>
+            </a:pPr>
+            <a:r>
+              <a:rPr lang="en-US" sz="2200">
+                <a:latin typeface="Courier New"/>
+                <a:ea typeface="Arial"/>
+              </a:rPr>
+              <a:t>      </a:t>
+            </a:r>
+            <a:r>
+              <a:rPr b="1" lang="en-US" sz="2200">
+                <a:latin typeface="Courier New"/>
+                <a:ea typeface="Arial"/>
+              </a:rPr>
+              <a:t>context.setState( context.STOPPED );</a:t>
+            </a:r>
+            <a:endParaRPr/>
+          </a:p>
+          <a:p>
+            <a:pPr>
+              <a:lnSpc>
+                <a:spcPct val="100000"/>
+              </a:lnSpc>
+            </a:pPr>
+            <a:r>
+              <a:rPr lang="en-US" sz="2200">
+                <a:latin typeface="Courier New"/>
+                <a:ea typeface="Arial"/>
+              </a:rPr>
+              <a:t>   </a:t>
+            </a:r>
+            <a:r>
+              <a:rPr lang="en-US" sz="2200">
+                <a:latin typeface="Courier New"/>
+                <a:ea typeface="Arial"/>
+              </a:rPr>
+              <a:t>}</a:t>
+            </a:r>
+            <a:endParaRPr/>
+          </a:p>
+          <a:p>
+            <a:pPr>
+              <a:lnSpc>
+                <a:spcPct val="100000"/>
+              </a:lnSpc>
+            </a:pPr>
+            <a:endParaRPr/>
+          </a:p>
+          <a:p>
+            <a:pPr>
+              <a:lnSpc>
+                <a:spcPct val="100000"/>
+              </a:lnSpc>
+            </a:pPr>
+            <a:r>
+              <a:rPr lang="en-US" sz="2200">
+                <a:latin typeface="Courier New"/>
+                <a:ea typeface="Arial"/>
+              </a:rPr>
+              <a:t>   </a:t>
+            </a:r>
+            <a:r>
+              <a:rPr lang="en-US" sz="2200">
+                <a:latin typeface="Courier New"/>
+                <a:ea typeface="Arial"/>
+              </a:rPr>
+              <a:t>public void start() {</a:t>
+            </a:r>
+            <a:endParaRPr/>
+          </a:p>
+          <a:p>
+            <a:pPr>
+              <a:lnSpc>
+                <a:spcPct val="100000"/>
+              </a:lnSpc>
+            </a:pPr>
+            <a:r>
+              <a:rPr lang="en-US" sz="2200">
+                <a:latin typeface="Courier New"/>
+                <a:ea typeface="Arial"/>
+              </a:rPr>
+              <a:t>      </a:t>
+            </a:r>
+            <a:r>
+              <a:rPr lang="en-US" sz="2200">
+                <a:latin typeface="Courier New"/>
+                <a:ea typeface="Arial"/>
+              </a:rPr>
+              <a:t>// already running so do nothing</a:t>
+            </a:r>
+            <a:endParaRPr/>
+          </a:p>
+          <a:p>
+            <a:pPr>
+              <a:lnSpc>
+                <a:spcPct val="100000"/>
+              </a:lnSpc>
+            </a:pPr>
+            <a:r>
+              <a:rPr lang="en-US" sz="2200">
+                <a:latin typeface="Courier New"/>
+                <a:ea typeface="Arial"/>
+              </a:rPr>
+              <a:t>   </a:t>
+            </a:r>
+            <a:r>
+              <a:rPr lang="en-US" sz="2200">
+                <a:latin typeface="Courier New"/>
+                <a:ea typeface="Arial"/>
+              </a:rPr>
+              <a:t>}</a:t>
+            </a:r>
+            <a:endParaRPr/>
+          </a:p>
+        </p:txBody>
+      </p:sp>
     </p:spTree>
   </p:cSld>
   <p:timing>
@@ -8032,14 +8497,14 @@
       </p:grpSpPr>
       <p:sp>
         <p:nvSpPr>
-          <p:cNvPr id="180" name="CustomShape 1"/>
+          <p:cNvPr id="181" name="CustomShape 1"/>
           <p:cNvSpPr/>
           <p:nvPr/>
         </p:nvSpPr>
         <p:spPr>
           <a:xfrm>
             <a:off x="611280" y="259920"/>
-            <a:ext cx="7921080" cy="864720"/>
+            <a:ext cx="7920720" cy="864360"/>
           </a:xfrm>
           <a:prstGeom prst="rect">
             <a:avLst/>
@@ -8067,87 +8532,31 @@
           </a:p>
         </p:txBody>
       </p:sp>
-      <p:sp>
-        <p:nvSpPr>
-          <p:cNvPr id="181" name="CustomShape 2"/>
-          <p:cNvSpPr/>
+      <p:pic>
+        <p:nvPicPr>
+          <p:cNvPr id="182" name="" descr=""/>
+          <p:cNvPicPr/>
           <p:nvPr/>
-        </p:nvSpPr>
-        <p:spPr>
-          <a:xfrm>
-            <a:off x="762120" y="1371600"/>
-            <a:ext cx="7848000" cy="897120"/>
-          </a:xfrm>
-          <a:prstGeom prst="rect">
-            <a:avLst/>
-          </a:prstGeom>
-          <a:noFill/>
+        </p:nvPicPr>
+        <p:blipFill>
+          <a:blip r:embed="rId1"/>
+          <a:stretch>
+            <a:fillRect/>
+          </a:stretch>
+        </p:blipFill>
+        <p:spPr>
+          <a:xfrm>
+            <a:off x="182880" y="2194560"/>
+            <a:ext cx="8412120" cy="3748680"/>
+          </a:xfrm>
+          <a:prstGeom prst="rect">
+            <a:avLst/>
+          </a:prstGeom>
           <a:ln>
             <a:noFill/>
           </a:ln>
         </p:spPr>
-        <p:txBody>
-          <a:bodyPr lIns="90000" rIns="90000" tIns="46800" bIns="46800"/>
-          <a:p>
-            <a:pPr>
-              <a:lnSpc>
-                <a:spcPct val="100000"/>
-              </a:lnSpc>
-            </a:pPr>
-            <a:r>
-              <a:rPr lang="en-US" sz="2400">
-                <a:latin typeface="Arial"/>
-                <a:ea typeface="Arial"/>
-              </a:rPr>
-              <a:t>Read </a:t>
-            </a:r>
-            <a:r>
-              <a:rPr i="1" lang="en-US" sz="2400">
-                <a:latin typeface="Arial"/>
-                <a:ea typeface="Arial"/>
-              </a:rPr>
-              <a:t>UML Distilled</a:t>
-            </a:r>
-            <a:r>
-              <a:rPr lang="en-US" sz="2400">
-                <a:latin typeface="Arial"/>
-                <a:ea typeface="Arial"/>
-              </a:rPr>
-              <a:t>, chapter 10.</a:t>
-            </a:r>
-            <a:endParaRPr/>
-          </a:p>
-          <a:p>
-            <a:pPr>
-              <a:lnSpc>
-                <a:spcPct val="100000"/>
-              </a:lnSpc>
-            </a:pPr>
-            <a:r>
-              <a:rPr lang="en-US" sz="2400">
-                <a:latin typeface="Arial"/>
-                <a:ea typeface="Arial"/>
-              </a:rPr>
-              <a:t>Also good: </a:t>
-            </a:r>
-            <a:r>
-              <a:rPr i="1" lang="en-US" sz="2400">
-                <a:latin typeface="Arial"/>
-                <a:ea typeface="Arial"/>
-              </a:rPr>
-              <a:t>UML for Java Programmers, </a:t>
-            </a:r>
-            <a:r>
-              <a:rPr lang="en-US" sz="2400">
-                <a:latin typeface="Arial"/>
-                <a:ea typeface="Arial"/>
-              </a:rPr>
-              <a:t>chapter 10.</a:t>
-            </a:r>
-            <a:endParaRPr/>
-          </a:p>
-        </p:txBody>
-      </p:sp>
+      </p:pic>
     </p:spTree>
   </p:cSld>
   <p:timing>
@@ -8206,14 +8615,14 @@
       </p:grpSpPr>
       <p:sp>
         <p:nvSpPr>
-          <p:cNvPr id="182" name="CustomShape 1"/>
+          <p:cNvPr id="183" name="CustomShape 1"/>
           <p:cNvSpPr/>
           <p:nvPr/>
         </p:nvSpPr>
         <p:spPr>
           <a:xfrm>
             <a:off x="611280" y="259920"/>
-            <a:ext cx="7921080" cy="864720"/>
+            <a:ext cx="7920720" cy="864360"/>
           </a:xfrm>
           <a:prstGeom prst="rect">
             <a:avLst/>
@@ -8235,22 +8644,22 @@
               <a:rPr lang="en-US" sz="3600">
                 <a:latin typeface="Arial"/>
               </a:rPr>
-              <a:t>Exercise: Skytrain Ticket Machine</a:t>
-            </a:r>
-            <a:endParaRPr/>
-          </a:p>
-        </p:txBody>
-      </p:sp>
-      <p:sp>
-        <p:nvSpPr>
-          <p:cNvPr id="183" name="CustomShape 2"/>
+              <a:t>UML State Machine Diagram</a:t>
+            </a:r>
+            <a:endParaRPr/>
+          </a:p>
+        </p:txBody>
+      </p:sp>
+      <p:sp>
+        <p:nvSpPr>
+          <p:cNvPr id="184" name="CustomShape 2"/>
           <p:cNvSpPr/>
           <p:nvPr/>
         </p:nvSpPr>
         <p:spPr>
           <a:xfrm>
-            <a:off x="731520" y="1554480"/>
-            <a:ext cx="7772040" cy="2547000"/>
+            <a:off x="762120" y="1371600"/>
+            <a:ext cx="7847640" cy="896760"/>
           </a:xfrm>
           <a:prstGeom prst="rect">
             <a:avLst/>
@@ -8261,40 +8670,62 @@
           </a:ln>
         </p:spPr>
         <p:txBody>
-          <a:bodyPr lIns="90000" rIns="90000" tIns="45000" bIns="45000"/>
-          <a:p>
-            <a:r>
-              <a:rPr lang="en-US" sz="2800">
-                <a:latin typeface="Arial"/>
-              </a:rPr>
-              <a:t>1. What are the states.</a:t>
-            </a:r>
-            <a:endParaRPr/>
-          </a:p>
-          <a:p>
-            <a:r>
-              <a:rPr lang="en-US" sz="2800">
-                <a:latin typeface="Arial"/>
-              </a:rPr>
-              <a:t>2. What are the events.</a:t>
-            </a:r>
-            <a:endParaRPr/>
-          </a:p>
-          <a:p>
-            <a:r>
-              <a:rPr lang="en-US" sz="2800">
-                <a:latin typeface="Arial"/>
-              </a:rPr>
-              <a:t>3. What actions/activities does ticket machine perform?</a:t>
-            </a:r>
-            <a:endParaRPr/>
-          </a:p>
-          <a:p>
-            <a:r>
-              <a:rPr lang="en-US" sz="2800">
-                <a:latin typeface="Arial"/>
-              </a:rPr>
-              <a:t>4. Draw a UML State Machine Diagram.</a:t>
+          <a:bodyPr lIns="90000" rIns="90000" tIns="46800" bIns="46800"/>
+          <a:p>
+            <a:pPr>
+              <a:lnSpc>
+                <a:spcPct val="100000"/>
+              </a:lnSpc>
+            </a:pPr>
+            <a:r>
+              <a:rPr lang="en-US" sz="2400">
+                <a:latin typeface="Arial"/>
+                <a:ea typeface="Arial"/>
+              </a:rPr>
+              <a:t>Read </a:t>
+            </a:r>
+            <a:r>
+              <a:rPr i="1" lang="en-US" sz="2400">
+                <a:latin typeface="Arial"/>
+                <a:ea typeface="Arial"/>
+              </a:rPr>
+              <a:t>UML Distilled</a:t>
+            </a:r>
+            <a:r>
+              <a:rPr lang="en-US" sz="2400">
+                <a:latin typeface="Arial"/>
+                <a:ea typeface="Arial"/>
+              </a:rPr>
+              <a:t>, chapter 10.</a:t>
+            </a:r>
+            <a:endParaRPr/>
+          </a:p>
+          <a:p>
+            <a:pPr>
+              <a:lnSpc>
+                <a:spcPct val="100000"/>
+              </a:lnSpc>
+            </a:pPr>
+            <a:r>
+              <a:rPr lang="en-US" sz="2400">
+                <a:latin typeface="Arial"/>
+                <a:ea typeface="Arial"/>
+              </a:rPr>
+              <a:t>Also good: </a:t>
+            </a:r>
+            <a:r>
+              <a:rPr i="1" lang="en-US" sz="2400">
+                <a:latin typeface="Arial"/>
+                <a:ea typeface="Arial"/>
+              </a:rPr>
+              <a:t>UML for Java Programmers, </a:t>
+            </a:r>
+            <a:r>
+              <a:rPr lang="en-US" sz="2400">
+                <a:latin typeface="Arial"/>
+                <a:ea typeface="Arial"/>
+              </a:rPr>
+              <a:t>chapter 10.</a:t>
             </a:r>
             <a:endParaRPr/>
           </a:p>
@@ -8356,31 +8787,102 @@
           <a:chExt cx="0" cy="0"/>
         </a:xfrm>
       </p:grpSpPr>
-      <p:pic>
-        <p:nvPicPr>
-          <p:cNvPr id="184" name="" descr=""/>
-          <p:cNvPicPr/>
+      <p:sp>
+        <p:nvSpPr>
+          <p:cNvPr id="185" name="CustomShape 1"/>
+          <p:cNvSpPr/>
           <p:nvPr/>
-        </p:nvPicPr>
-        <p:blipFill>
-          <a:blip r:embed="rId1"/>
-          <a:stretch>
-            <a:fillRect/>
-          </a:stretch>
-        </p:blipFill>
-        <p:spPr>
-          <a:xfrm>
-            <a:off x="1188720" y="91440"/>
-            <a:ext cx="6583320" cy="6766200"/>
-          </a:xfrm>
-          <a:prstGeom prst="rect">
-            <a:avLst/>
-          </a:prstGeom>
+        </p:nvSpPr>
+        <p:spPr>
+          <a:xfrm>
+            <a:off x="611280" y="259920"/>
+            <a:ext cx="7920720" cy="864360"/>
+          </a:xfrm>
+          <a:prstGeom prst="rect">
+            <a:avLst/>
+          </a:prstGeom>
+          <a:noFill/>
           <a:ln>
             <a:noFill/>
           </a:ln>
         </p:spPr>
-      </p:pic>
+        <p:txBody>
+          <a:bodyPr lIns="90000" rIns="90000" tIns="46800" bIns="46800" anchor="b"/>
+          <a:p>
+            <a:pPr algn="ctr">
+              <a:lnSpc>
+                <a:spcPct val="100000"/>
+              </a:lnSpc>
+            </a:pPr>
+            <a:r>
+              <a:rPr lang="en-US" sz="3600">
+                <a:latin typeface="Arial"/>
+              </a:rPr>
+              <a:t>Exercise: Skytrain Ticket Machine</a:t>
+            </a:r>
+            <a:endParaRPr/>
+          </a:p>
+        </p:txBody>
+      </p:sp>
+      <p:sp>
+        <p:nvSpPr>
+          <p:cNvPr id="186" name="CustomShape 2"/>
+          <p:cNvSpPr/>
+          <p:nvPr/>
+        </p:nvSpPr>
+        <p:spPr>
+          <a:xfrm>
+            <a:off x="731520" y="1554480"/>
+            <a:ext cx="7771680" cy="2546640"/>
+          </a:xfrm>
+          <a:prstGeom prst="rect">
+            <a:avLst/>
+          </a:prstGeom>
+          <a:noFill/>
+          <a:ln>
+            <a:noFill/>
+          </a:ln>
+        </p:spPr>
+        <p:txBody>
+          <a:bodyPr lIns="90000" rIns="90000" tIns="45000" bIns="45000"/>
+          <a:p>
+            <a:r>
+              <a:rPr lang="en-US" sz="2800">
+                <a:latin typeface="Arial"/>
+              </a:rPr>
+              <a:t>1. What are the states.</a:t>
+            </a:r>
+            <a:endParaRPr/>
+          </a:p>
+          <a:p>
+            <a:r>
+              <a:rPr lang="en-US" sz="2800">
+                <a:latin typeface="Arial"/>
+              </a:rPr>
+              <a:t>2. What are the events.</a:t>
+            </a:r>
+            <a:endParaRPr/>
+          </a:p>
+          <a:p>
+            <a:r>
+              <a:rPr lang="en-US" sz="2800">
+                <a:latin typeface="Arial"/>
+              </a:rPr>
+              <a:t>3. What actions/activities does ticket machine perform?</a:t>
+            </a:r>
+            <a:endParaRPr/>
+          </a:p>
+          <a:p>
+            <a:r>
+              <a:rPr lang="en-US" sz="2800">
+                <a:latin typeface="Arial"/>
+              </a:rPr>
+              <a:t>4. Draw a UML State Machine Diagram.</a:t>
+            </a:r>
+            <a:endParaRPr/>
+          </a:p>
+        </p:txBody>
+      </p:sp>
     </p:spTree>
   </p:cSld>
   <p:timing>
@@ -8446,7 +8948,7 @@
         <p:spPr>
           <a:xfrm>
             <a:off x="611280" y="259920"/>
-            <a:ext cx="7921080" cy="864720"/>
+            <a:ext cx="7920720" cy="864360"/>
           </a:xfrm>
           <a:prstGeom prst="rect">
             <a:avLst/>
@@ -8483,7 +8985,7 @@
         <p:spPr>
           <a:xfrm>
             <a:off x="611280" y="1447920"/>
-            <a:ext cx="7921080" cy="4678200"/>
+            <a:ext cx="7920720" cy="4677840"/>
           </a:xfrm>
           <a:prstGeom prst="rect">
             <a:avLst/>
@@ -8527,6 +9029,14 @@
                 <a:spcPct val="100000"/>
               </a:lnSpc>
             </a:pPr>
+            <a:endParaRPr/>
+          </a:p>
+          <a:p>
+            <a:pPr>
+              <a:lnSpc>
+                <a:spcPct val="100000"/>
+              </a:lnSpc>
+            </a:pPr>
             <a:r>
               <a:rPr lang="en-US" sz="2400">
                 <a:latin typeface="Arial"/>
@@ -8542,7 +9052,7 @@
               </a:lnSpc>
               <a:buSzPct val="45000"/>
               <a:buFont typeface="StarSymbol"/>
-              <a:buChar char="l"/>
+              <a:buChar char=""/>
             </a:pPr>
             <a:r>
               <a:rPr lang="en-US" sz="2400">
@@ -8559,7 +9069,7 @@
               </a:lnSpc>
               <a:buSzPct val="45000"/>
               <a:buFont typeface="StarSymbol"/>
-              <a:buChar char="l"/>
+              <a:buChar char=""/>
             </a:pPr>
             <a:r>
               <a:rPr lang="en-US" sz="2400">
@@ -8576,7 +9086,7 @@
               </a:lnSpc>
               <a:buSzPct val="45000"/>
               <a:buFont typeface="StarSymbol"/>
-              <a:buChar char="l"/>
+              <a:buChar char=""/>
             </a:pPr>
             <a:r>
               <a:rPr lang="en-US" sz="2400">
@@ -8593,7 +9103,7 @@
               </a:lnSpc>
               <a:buSzPct val="45000"/>
               <a:buFont typeface="StarSymbol"/>
-              <a:buChar char="l"/>
+              <a:buChar char=""/>
             </a:pPr>
             <a:r>
               <a:rPr lang="en-US" sz="2400">
@@ -8610,7 +9120,7 @@
               </a:lnSpc>
               <a:buSzPct val="45000"/>
               <a:buFont typeface="StarSymbol"/>
-              <a:buChar char="l"/>
+              <a:buChar char=""/>
             </a:pPr>
             <a:r>
               <a:rPr lang="en-US" sz="2400">
@@ -8684,186 +9194,31 @@
           <a:chExt cx="0" cy="0"/>
         </a:xfrm>
       </p:grpSpPr>
-      <p:sp>
-        <p:nvSpPr>
-          <p:cNvPr id="185" name="CustomShape 1"/>
-          <p:cNvSpPr/>
+      <p:pic>
+        <p:nvPicPr>
+          <p:cNvPr id="187" name="" descr=""/>
+          <p:cNvPicPr/>
           <p:nvPr/>
-        </p:nvSpPr>
-        <p:spPr>
-          <a:xfrm>
-            <a:off x="611280" y="259920"/>
-            <a:ext cx="7921080" cy="864720"/>
-          </a:xfrm>
-          <a:prstGeom prst="rect">
-            <a:avLst/>
-          </a:prstGeom>
-          <a:noFill/>
+        </p:nvPicPr>
+        <p:blipFill>
+          <a:blip r:embed="rId1"/>
+          <a:stretch>
+            <a:fillRect/>
+          </a:stretch>
+        </p:blipFill>
+        <p:spPr>
+          <a:xfrm>
+            <a:off x="1188720" y="91440"/>
+            <a:ext cx="6582960" cy="6765840"/>
+          </a:xfrm>
+          <a:prstGeom prst="rect">
+            <a:avLst/>
+          </a:prstGeom>
           <a:ln>
             <a:noFill/>
           </a:ln>
         </p:spPr>
-        <p:txBody>
-          <a:bodyPr lIns="90000" rIns="90000" tIns="46800" bIns="46800" anchor="b"/>
-          <a:p>
-            <a:pPr algn="ctr">
-              <a:lnSpc>
-                <a:spcPct val="100000"/>
-              </a:lnSpc>
-            </a:pPr>
-            <a:r>
-              <a:rPr lang="en-US" sz="3600">
-                <a:latin typeface="Arial"/>
-              </a:rPr>
-              <a:t>Exercise: Syllable Counter</a:t>
-            </a:r>
-            <a:endParaRPr/>
-          </a:p>
-        </p:txBody>
-      </p:sp>
-      <p:sp>
-        <p:nvSpPr>
-          <p:cNvPr id="186" name="CustomShape 2"/>
-          <p:cNvSpPr/>
-          <p:nvPr/>
-        </p:nvSpPr>
-        <p:spPr>
-          <a:xfrm>
-            <a:off x="731520" y="1554480"/>
-            <a:ext cx="7863480" cy="5120280"/>
-          </a:xfrm>
-          <a:prstGeom prst="rect">
-            <a:avLst/>
-          </a:prstGeom>
-          <a:noFill/>
-          <a:ln>
-            <a:noFill/>
-          </a:ln>
-        </p:spPr>
-        <p:txBody>
-          <a:bodyPr lIns="90000" rIns="90000" tIns="45000" bIns="45000"/>
-          <a:p>
-            <a:r>
-              <a:rPr lang="en-US" sz="2400">
-                <a:latin typeface="Arial"/>
-              </a:rPr>
-              <a:t>Count the syllables in a word.</a:t>
-            </a:r>
-            <a:endParaRPr/>
-          </a:p>
-          <a:p>
-            <a:r>
-              <a:rPr lang="en-US" sz="2400">
-                <a:latin typeface="Arial"/>
-              </a:rPr>
-              <a:t>As a heuristic, we will count </a:t>
-            </a:r>
-            <a:r>
-              <a:rPr i="1" lang="en-US" sz="2400">
-                <a:latin typeface="Arial"/>
-              </a:rPr>
-              <a:t>vowel sequences</a:t>
-            </a:r>
-            <a:r>
-              <a:rPr lang="en-US" sz="2400">
-                <a:latin typeface="Arial"/>
-              </a:rPr>
-              <a:t>.</a:t>
-            </a:r>
-            <a:endParaRPr/>
-          </a:p>
-          <a:p>
-            <a:r>
-              <a:rPr lang="en-US" sz="2400">
-                <a:latin typeface="Arial"/>
-              </a:rPr>
-              <a:t>Example:</a:t>
-            </a:r>
-            <a:endParaRPr/>
-          </a:p>
-          <a:p>
-            <a:r>
-              <a:rPr lang="en-US" sz="2400">
-                <a:latin typeface="Arial"/>
-              </a:rPr>
-              <a:t>object = (o)bj(e)ct = 2 vowel sequences</a:t>
-            </a:r>
-            <a:endParaRPr/>
-          </a:p>
-          <a:p>
-            <a:r>
-              <a:rPr lang="en-US" sz="2400">
-                <a:latin typeface="Arial"/>
-              </a:rPr>
-              <a:t>beauty = b(eau)t(y) = 2 vowel sequences</a:t>
-            </a:r>
-            <a:endParaRPr/>
-          </a:p>
-          <a:p>
-            <a:r>
-              <a:rPr lang="en-US" sz="2400">
-                <a:latin typeface="Arial"/>
-              </a:rPr>
-              <a:t>Special cases:</a:t>
-            </a:r>
-            <a:endParaRPr/>
-          </a:p>
-          <a:p>
-            <a:r>
-              <a:rPr lang="en-US" sz="2400">
-                <a:latin typeface="Arial"/>
-              </a:rPr>
-              <a:t>l(a)y(ou)t = </a:t>
-            </a:r>
-            <a:r>
-              <a:rPr i="1" lang="en-US" sz="2400">
-                <a:latin typeface="Arial"/>
-              </a:rPr>
-              <a:t>treat "y" as consonant after other vowel</a:t>
-            </a:r>
-            <a:endParaRPr/>
-          </a:p>
-          <a:p>
-            <a:r>
-              <a:rPr lang="en-US" sz="2400">
-                <a:latin typeface="Arial"/>
-              </a:rPr>
-              <a:t>l(a)the = don't count final "e" if it a single vowel</a:t>
-            </a:r>
-            <a:endParaRPr/>
-          </a:p>
-          <a:p>
-            <a:r>
-              <a:rPr lang="en-US" sz="2400">
-                <a:latin typeface="Arial"/>
-              </a:rPr>
-              <a:t>th(e) = exception. count "e" if it is </a:t>
-            </a:r>
-            <a:r>
-              <a:rPr i="1" lang="en-US" sz="2400" u="sng">
-                <a:latin typeface="Arial"/>
-              </a:rPr>
-              <a:t>only</a:t>
-            </a:r>
-            <a:r>
-              <a:rPr lang="en-US" sz="2400">
-                <a:latin typeface="Arial"/>
-              </a:rPr>
-              <a:t> vowel</a:t>
-            </a:r>
-            <a:endParaRPr/>
-          </a:p>
-          <a:p>
-            <a:r>
-              <a:rPr lang="en-US" sz="2400">
-                <a:latin typeface="Arial"/>
-              </a:rPr>
-              <a:t>anti-oxident = (a)nt(i)-(o)x(i)d(e)nt   "-" is non-vowel</a:t>
-            </a:r>
-            <a:endParaRPr/>
-          </a:p>
-        </p:txBody>
-      </p:sp>
+      </p:pic>
     </p:spTree>
   </p:cSld>
   <p:timing>
@@ -8922,14 +9277,14 @@
       </p:grpSpPr>
       <p:sp>
         <p:nvSpPr>
-          <p:cNvPr id="187" name="CustomShape 1"/>
+          <p:cNvPr id="188" name="CustomShape 1"/>
           <p:cNvSpPr/>
           <p:nvPr/>
         </p:nvSpPr>
         <p:spPr>
           <a:xfrm>
             <a:off x="611280" y="259920"/>
-            <a:ext cx="7921080" cy="864720"/>
+            <a:ext cx="7920720" cy="864360"/>
           </a:xfrm>
           <a:prstGeom prst="rect">
             <a:avLst/>
@@ -8951,22 +9306,22 @@
               <a:rPr lang="en-US" sz="3600">
                 <a:latin typeface="Arial"/>
               </a:rPr>
-              <a:t>Example Words</a:t>
-            </a:r>
-            <a:endParaRPr/>
-          </a:p>
-        </p:txBody>
-      </p:sp>
-      <p:sp>
-        <p:nvSpPr>
-          <p:cNvPr id="188" name="CustomShape 2"/>
+              <a:t>Exercise: Syllable Counter</a:t>
+            </a:r>
+            <a:endParaRPr/>
+          </a:p>
+        </p:txBody>
+      </p:sp>
+      <p:sp>
+        <p:nvSpPr>
+          <p:cNvPr id="189" name="CustomShape 2"/>
           <p:cNvSpPr/>
           <p:nvPr/>
         </p:nvSpPr>
         <p:spPr>
           <a:xfrm>
             <a:off x="731520" y="1554480"/>
-            <a:ext cx="8229240" cy="5120280"/>
+            <a:ext cx="8229600" cy="5119920"/>
           </a:xfrm>
           <a:prstGeom prst="rect">
             <a:avLst/>
@@ -8980,73 +9335,133 @@
           <a:bodyPr lIns="90000" rIns="90000" tIns="45000" bIns="45000"/>
           <a:p>
             <a:r>
-              <a:rPr lang="en-US" sz="2800">
-                <a:latin typeface="Arial"/>
-              </a:rPr>
-              <a:t>How many vowel sequences in these words:</a:t>
-            </a:r>
-            <a:endParaRPr/>
-          </a:p>
-          <a:p>
-            <a:r>
-              <a:rPr lang="en-US" sz="2800">
-                <a:latin typeface="Courier New"/>
-              </a:rPr>
-              <a:t>remarkable</a:t>
-            </a:r>
-            <a:endParaRPr/>
-          </a:p>
-          <a:p>
-            <a:r>
-              <a:rPr lang="en-US" sz="2800">
-                <a:latin typeface="Courier New"/>
-              </a:rPr>
-              <a:t>selfie</a:t>
-            </a:r>
-            <a:endParaRPr/>
-          </a:p>
-          <a:p>
-            <a:r>
-              <a:rPr lang="en-US" sz="2800">
-                <a:latin typeface="Courier New"/>
-              </a:rPr>
-              <a:t>county</a:t>
-            </a:r>
-            <a:endParaRPr/>
-          </a:p>
-          <a:p>
-            <a:r>
-              <a:rPr lang="en-US" sz="2800">
-                <a:latin typeface="Courier New"/>
-              </a:rPr>
-              <a:t>coincidentally</a:t>
-            </a:r>
-            <a:endParaRPr/>
-          </a:p>
-          <a:p>
-            <a:r>
-              <a:rPr lang="en-US" sz="2800">
-                <a:latin typeface="Courier New"/>
-              </a:rPr>
-              <a:t>she</a:t>
-            </a:r>
-            <a:endParaRPr/>
-          </a:p>
-          <a:p>
-            <a:r>
-              <a:rPr lang="en-US" sz="2800">
-                <a:latin typeface="Courier New"/>
-              </a:rPr>
-              <a:t>mate</a:t>
-            </a:r>
-            <a:endParaRPr/>
-          </a:p>
-          <a:p>
-            <a:r>
-              <a:rPr lang="en-US" sz="2800">
-                <a:latin typeface="Courier New"/>
-              </a:rPr>
-              <a:t>isn't</a:t>
+              <a:rPr lang="en-US" sz="2400">
+                <a:latin typeface="Arial"/>
+              </a:rPr>
+              <a:t>Count the syllables in a word.</a:t>
+            </a:r>
+            <a:endParaRPr/>
+          </a:p>
+          <a:p>
+            <a:r>
+              <a:rPr lang="en-US" sz="2400">
+                <a:latin typeface="Arial"/>
+              </a:rPr>
+              <a:t>As a heuristic, we will count </a:t>
+            </a:r>
+            <a:r>
+              <a:rPr i="1" lang="en-US" sz="2400">
+                <a:solidFill>
+                  <a:srgbClr val="000080"/>
+                </a:solidFill>
+                <a:latin typeface="Arial"/>
+              </a:rPr>
+              <a:t>vowel sequences</a:t>
+            </a:r>
+            <a:r>
+              <a:rPr lang="en-US" sz="2400">
+                <a:latin typeface="Arial"/>
+              </a:rPr>
+              <a:t>.</a:t>
+            </a:r>
+            <a:endParaRPr/>
+          </a:p>
+          <a:p>
+            <a:r>
+              <a:rPr lang="en-US" sz="2400">
+                <a:latin typeface="Arial"/>
+              </a:rPr>
+              <a:t>Example:</a:t>
+            </a:r>
+            <a:endParaRPr/>
+          </a:p>
+          <a:p>
+            <a:r>
+              <a:rPr lang="en-US" sz="2400">
+                <a:latin typeface="Arial"/>
+              </a:rPr>
+              <a:t>object = (o)bj(e)ct = 2 vowel sequences</a:t>
+            </a:r>
+            <a:endParaRPr/>
+          </a:p>
+          <a:p>
+            <a:r>
+              <a:rPr lang="en-US" sz="2400">
+                <a:latin typeface="Arial"/>
+              </a:rPr>
+              <a:t>beauty = b(eau)t(y) = 2 vowel sequences</a:t>
+            </a:r>
+            <a:endParaRPr/>
+          </a:p>
+          <a:p>
+            <a:r>
+              <a:rPr lang="en-US" sz="2400">
+                <a:latin typeface="Arial"/>
+              </a:rPr>
+              <a:t>Special cases:</a:t>
+            </a:r>
+            <a:endParaRPr/>
+          </a:p>
+          <a:p>
+            <a:r>
+              <a:rPr lang="en-US" sz="2400">
+                <a:latin typeface="Arial"/>
+              </a:rPr>
+              <a:t>l(a)y(ou)t = </a:t>
+            </a:r>
+            <a:r>
+              <a:rPr i="1" lang="en-US" sz="2400">
+                <a:latin typeface="Arial"/>
+              </a:rPr>
+              <a:t>treat "y" as consonant after other vowel</a:t>
+            </a:r>
+            <a:endParaRPr/>
+          </a:p>
+          <a:p>
+            <a:r>
+              <a:rPr lang="en-US" sz="2400">
+                <a:latin typeface="Arial"/>
+              </a:rPr>
+              <a:t>l(a)the = don't count final "e" if it is a single vowel</a:t>
+            </a:r>
+            <a:endParaRPr/>
+          </a:p>
+          <a:p>
+            <a:r>
+              <a:rPr lang="en-US" sz="2400">
+                <a:latin typeface="Arial"/>
+              </a:rPr>
+              <a:t>m(o)v(ie) = 2 vowel seq.  "final e" rule doesn't apply here.</a:t>
+            </a:r>
+            <a:endParaRPr/>
+          </a:p>
+          <a:p>
+            <a:r>
+              <a:rPr lang="en-US" sz="2400">
+                <a:latin typeface="Arial"/>
+              </a:rPr>
+              <a:t>th(e) = exception. count final "e" if it is </a:t>
+            </a:r>
+            <a:r>
+              <a:rPr i="1" lang="en-US" sz="2400" u="sng">
+                <a:latin typeface="Arial"/>
+              </a:rPr>
+              <a:t>only</a:t>
+            </a:r>
+            <a:r>
+              <a:rPr lang="en-US" sz="2400">
+                <a:latin typeface="Arial"/>
+              </a:rPr>
+              <a:t> vowel</a:t>
+            </a:r>
+            <a:endParaRPr/>
+          </a:p>
+          <a:p>
+            <a:r>
+              <a:rPr lang="en-US" sz="2400">
+                <a:latin typeface="Arial"/>
+              </a:rPr>
+              <a:t>anti-oxident = (a)nt(i)-(o)x(i)d(e)nt   "-" is non-vowel</a:t>
             </a:r>
             <a:endParaRPr/>
           </a:p>
@@ -9110,14 +9525,14 @@
       </p:grpSpPr>
       <p:sp>
         <p:nvSpPr>
-          <p:cNvPr id="189" name="CustomShape 1"/>
+          <p:cNvPr id="190" name="CustomShape 1"/>
           <p:cNvSpPr/>
           <p:nvPr/>
         </p:nvSpPr>
         <p:spPr>
           <a:xfrm>
             <a:off x="611280" y="259920"/>
-            <a:ext cx="7921080" cy="864720"/>
+            <a:ext cx="7920720" cy="864360"/>
           </a:xfrm>
           <a:prstGeom prst="rect">
             <a:avLst/>
@@ -9139,22 +9554,22 @@
               <a:rPr lang="en-US" sz="3600">
                 <a:latin typeface="Arial"/>
               </a:rPr>
-              <a:t>Exercise: Calculator</a:t>
-            </a:r>
-            <a:endParaRPr/>
-          </a:p>
-        </p:txBody>
-      </p:sp>
-      <p:sp>
-        <p:nvSpPr>
-          <p:cNvPr id="190" name="CustomShape 2"/>
+              <a:t>Example Words</a:t>
+            </a:r>
+            <a:endParaRPr/>
+          </a:p>
+        </p:txBody>
+      </p:sp>
+      <p:sp>
+        <p:nvSpPr>
+          <p:cNvPr id="191" name="CustomShape 2"/>
           <p:cNvSpPr/>
           <p:nvPr/>
         </p:nvSpPr>
         <p:spPr>
           <a:xfrm>
             <a:off x="731520" y="1554480"/>
-            <a:ext cx="7772040" cy="5120280"/>
+            <a:ext cx="8228880" cy="5119920"/>
           </a:xfrm>
           <a:prstGeom prst="rect">
             <a:avLst/>
@@ -9171,64 +9586,70 @@
               <a:rPr lang="en-US" sz="2800">
                 <a:latin typeface="Arial"/>
               </a:rPr>
-              <a:t>A calculator that behaves like Windows calc.</a:t>
+              <a:t>How many vowel sequences in these words:</a:t>
             </a:r>
             <a:endParaRPr/>
           </a:p>
           <a:p>
             <a:r>
               <a:rPr lang="en-US" sz="2800">
-                <a:latin typeface="Arial"/>
-              </a:rPr>
-              <a:t>Use:  http://www.online-calculator.com</a:t>
-            </a:r>
-            <a:endParaRPr/>
-          </a:p>
-          <a:p>
+                <a:latin typeface="Courier New"/>
+              </a:rPr>
+              <a:t>remarkable</a:t>
+            </a:r>
             <a:endParaRPr/>
           </a:p>
           <a:p>
             <a:r>
               <a:rPr lang="en-US" sz="2800">
-                <a:latin typeface="Arial"/>
-              </a:rPr>
-              <a:t>1. What are the states.</a:t>
+                <a:latin typeface="Courier New"/>
+              </a:rPr>
+              <a:t>selfie</a:t>
             </a:r>
             <a:endParaRPr/>
           </a:p>
           <a:p>
             <a:r>
               <a:rPr lang="en-US" sz="2800">
-                <a:latin typeface="Arial"/>
-              </a:rPr>
-              <a:t>2. What are the events.</a:t>
+                <a:latin typeface="Courier New"/>
+              </a:rPr>
+              <a:t>county</a:t>
             </a:r>
             <a:endParaRPr/>
           </a:p>
           <a:p>
             <a:r>
               <a:rPr lang="en-US" sz="2800">
-                <a:latin typeface="Arial"/>
-              </a:rPr>
-              <a:t>3. What actions/activities does ticket machine perform?</a:t>
+                <a:latin typeface="Courier New"/>
+              </a:rPr>
+              <a:t>coincidentally</a:t>
             </a:r>
             <a:endParaRPr/>
           </a:p>
           <a:p>
             <a:r>
               <a:rPr lang="en-US" sz="2800">
-                <a:latin typeface="Arial"/>
-              </a:rPr>
-              <a:t>4. Draw a UML State Machine Diagram.</a:t>
+                <a:latin typeface="Courier New"/>
+              </a:rPr>
+              <a:t>she</a:t>
             </a:r>
             <a:endParaRPr/>
           </a:p>
           <a:p>
             <a:r>
               <a:rPr lang="en-US" sz="2800">
-                <a:latin typeface="Arial"/>
-              </a:rPr>
-              <a:t>(not so easy)</a:t>
+                <a:latin typeface="Courier New"/>
+              </a:rPr>
+              <a:t>mate</a:t>
+            </a:r>
+            <a:endParaRPr/>
+          </a:p>
+          <a:p>
+            <a:r>
+              <a:rPr lang="en-US" sz="2800">
+                <a:latin typeface="Courier New"/>
+              </a:rPr>
+              <a:t>isn't</a:t>
             </a:r>
             <a:endParaRPr/>
           </a:p>
@@ -9292,14 +9713,14 @@
       </p:grpSpPr>
       <p:sp>
         <p:nvSpPr>
-          <p:cNvPr id="191" name="CustomShape 1"/>
+          <p:cNvPr id="192" name="CustomShape 1"/>
           <p:cNvSpPr/>
           <p:nvPr/>
         </p:nvSpPr>
         <p:spPr>
           <a:xfrm>
             <a:off x="611280" y="259920"/>
-            <a:ext cx="7921080" cy="864720"/>
+            <a:ext cx="7920720" cy="864360"/>
           </a:xfrm>
           <a:prstGeom prst="rect">
             <a:avLst/>
@@ -9321,22 +9742,22 @@
               <a:rPr lang="en-US" sz="3600">
                 <a:latin typeface="Arial"/>
               </a:rPr>
-              <a:t>PA5: Cheap Digital Clock</a:t>
-            </a:r>
-            <a:endParaRPr/>
-          </a:p>
-        </p:txBody>
-      </p:sp>
-      <p:sp>
-        <p:nvSpPr>
-          <p:cNvPr id="192" name="CustomShape 2"/>
+              <a:t>Exercise: Calculator</a:t>
+            </a:r>
+            <a:endParaRPr/>
+          </a:p>
+        </p:txBody>
+      </p:sp>
+      <p:sp>
+        <p:nvSpPr>
+          <p:cNvPr id="193" name="CustomShape 2"/>
           <p:cNvSpPr/>
           <p:nvPr/>
         </p:nvSpPr>
         <p:spPr>
           <a:xfrm>
             <a:off x="731520" y="1554480"/>
-            <a:ext cx="7772040" cy="5120280"/>
+            <a:ext cx="7771680" cy="5119920"/>
           </a:xfrm>
           <a:prstGeom prst="rect">
             <a:avLst/>
@@ -9353,11 +9774,8 @@
               <a:rPr lang="en-US" sz="2800">
                 <a:latin typeface="Arial"/>
               </a:rPr>
-              <a:t>cheap digital alarm clock.</a:t>
-            </a:r>
-            <a:endParaRPr/>
-          </a:p>
-          <a:p>
+              <a:t>A calculator that behaves like Windows calc.</a:t>
+            </a:r>
             <a:endParaRPr/>
           </a:p>
           <a:p>
@@ -9365,7 +9783,55 @@
               <a:rPr lang="en-US" sz="2800">
                 <a:latin typeface="Arial"/>
               </a:rPr>
-              <a:t>Use states!</a:t>
+              <a:t>Use:  http://www.online-calculator.com</a:t>
+            </a:r>
+            <a:endParaRPr/>
+          </a:p>
+          <a:p>
+            <a:endParaRPr/>
+          </a:p>
+          <a:p>
+            <a:r>
+              <a:rPr lang="en-US" sz="2800">
+                <a:latin typeface="Arial"/>
+              </a:rPr>
+              <a:t>1. What are the states.</a:t>
+            </a:r>
+            <a:endParaRPr/>
+          </a:p>
+          <a:p>
+            <a:r>
+              <a:rPr lang="en-US" sz="2800">
+                <a:latin typeface="Arial"/>
+              </a:rPr>
+              <a:t>2. What are the events.</a:t>
+            </a:r>
+            <a:endParaRPr/>
+          </a:p>
+          <a:p>
+            <a:r>
+              <a:rPr lang="en-US" sz="2800">
+                <a:latin typeface="Arial"/>
+              </a:rPr>
+              <a:t>3. What actions/activities does ticket machine perform?</a:t>
+            </a:r>
+            <a:endParaRPr/>
+          </a:p>
+          <a:p>
+            <a:r>
+              <a:rPr lang="en-US" sz="2800">
+                <a:latin typeface="Arial"/>
+              </a:rPr>
+              <a:t>4. Draw a UML State Machine Diagram.</a:t>
+            </a:r>
+            <a:endParaRPr/>
+          </a:p>
+          <a:p>
+            <a:r>
+              <a:rPr lang="en-US" sz="2800">
+                <a:latin typeface="Arial"/>
+              </a:rPr>
+              <a:t>(not so easy)</a:t>
             </a:r>
             <a:endParaRPr/>
           </a:p>
@@ -9380,6 +9846,143 @@
           <p:childTnLst>
             <p:seq>
               <p:cTn id="46" dur="indefinite" nodeType="mainSeq"/>
+              <p:prevCondLst>
+                <p:cond delay="0" evt="onPrev">
+                  <p:tgtEl>
+                    <p:sldTgt/>
+                  </p:tgtEl>
+                </p:cond>
+              </p:prevCondLst>
+              <p:nextCondLst>
+                <p:cond delay="0" evt="onNext">
+                  <p:tgtEl>
+                    <p:sldTgt/>
+                  </p:tgtEl>
+                </p:cond>
+              </p:nextCondLst>
+            </p:seq>
+          </p:childTnLst>
+        </p:cTn>
+      </p:par>
+    </p:tnLst>
+  </p:timing>
+</p:sld>
+</file>
+
+<file path=ppt/slides/slide24.xml><?xml version="1.0" encoding="utf-8"?>
+<p:sld xmlns:a="http://schemas.openxmlformats.org/drawingml/2006/main" xmlns:p="http://schemas.openxmlformats.org/presentationml/2006/main" xmlns:r="http://schemas.openxmlformats.org/officeDocument/2006/relationships">
+  <p:cSld>
+    <p:bg>
+      <p:bgPr>
+        <a:solidFill>
+          <a:srgbClr val="ffffff"/>
+        </a:solidFill>
+      </p:bgPr>
+    </p:bg>
+    <p:spTree>
+      <p:nvGrpSpPr>
+        <p:cNvPr id="1" name=""/>
+        <p:cNvGrpSpPr/>
+        <p:nvPr/>
+      </p:nvGrpSpPr>
+      <p:grpSpPr>
+        <a:xfrm>
+          <a:off x="0" y="0"/>
+          <a:ext cx="0" cy="0"/>
+          <a:chOff x="0" y="0"/>
+          <a:chExt cx="0" cy="0"/>
+        </a:xfrm>
+      </p:grpSpPr>
+      <p:sp>
+        <p:nvSpPr>
+          <p:cNvPr id="194" name="CustomShape 1"/>
+          <p:cNvSpPr/>
+          <p:nvPr/>
+        </p:nvSpPr>
+        <p:spPr>
+          <a:xfrm>
+            <a:off x="611280" y="259920"/>
+            <a:ext cx="7920720" cy="864360"/>
+          </a:xfrm>
+          <a:prstGeom prst="rect">
+            <a:avLst/>
+          </a:prstGeom>
+          <a:noFill/>
+          <a:ln>
+            <a:noFill/>
+          </a:ln>
+        </p:spPr>
+        <p:txBody>
+          <a:bodyPr lIns="90000" rIns="90000" tIns="46800" bIns="46800" anchor="b"/>
+          <a:p>
+            <a:pPr algn="ctr">
+              <a:lnSpc>
+                <a:spcPct val="100000"/>
+              </a:lnSpc>
+            </a:pPr>
+            <a:r>
+              <a:rPr lang="en-US" sz="3600">
+                <a:latin typeface="Arial"/>
+              </a:rPr>
+              <a:t>PA5: Cheap Digital Clock</a:t>
+            </a:r>
+            <a:endParaRPr/>
+          </a:p>
+        </p:txBody>
+      </p:sp>
+      <p:sp>
+        <p:nvSpPr>
+          <p:cNvPr id="195" name="CustomShape 2"/>
+          <p:cNvSpPr/>
+          <p:nvPr/>
+        </p:nvSpPr>
+        <p:spPr>
+          <a:xfrm>
+            <a:off x="731520" y="1554480"/>
+            <a:ext cx="7771680" cy="5119920"/>
+          </a:xfrm>
+          <a:prstGeom prst="rect">
+            <a:avLst/>
+          </a:prstGeom>
+          <a:noFill/>
+          <a:ln>
+            <a:noFill/>
+          </a:ln>
+        </p:spPr>
+        <p:txBody>
+          <a:bodyPr lIns="90000" rIns="90000" tIns="45000" bIns="45000"/>
+          <a:p>
+            <a:r>
+              <a:rPr lang="en-US" sz="2800">
+                <a:latin typeface="Arial"/>
+              </a:rPr>
+              <a:t>cheap digital alarm clock.</a:t>
+            </a:r>
+            <a:endParaRPr/>
+          </a:p>
+          <a:p>
+            <a:endParaRPr/>
+          </a:p>
+          <a:p>
+            <a:r>
+              <a:rPr lang="en-US" sz="2800">
+                <a:latin typeface="Arial"/>
+              </a:rPr>
+              <a:t>Use states!</a:t>
+            </a:r>
+            <a:endParaRPr/>
+          </a:p>
+        </p:txBody>
+      </p:sp>
+    </p:spTree>
+  </p:cSld>
+  <p:timing>
+    <p:tnLst>
+      <p:par>
+        <p:cTn id="47" dur="indefinite" restart="never" nodeType="tmRoot">
+          <p:childTnLst>
+            <p:seq>
+              <p:cTn id="48" dur="indefinite" nodeType="mainSeq"/>
               <p:prevCondLst>
                 <p:cond delay="0" evt="onPrev">
                   <p:tgtEl>
@@ -9429,7 +10032,7 @@
         <p:spPr>
           <a:xfrm>
             <a:off x="610920" y="259920"/>
-            <a:ext cx="7917840" cy="861840"/>
+            <a:ext cx="7917480" cy="861480"/>
           </a:xfrm>
           <a:prstGeom prst="rect">
             <a:avLst/>
@@ -9461,7 +10064,7 @@
         <p:spPr>
           <a:xfrm>
             <a:off x="674640" y="1400040"/>
-            <a:ext cx="7918200" cy="4460760"/>
+            <a:ext cx="7917840" cy="4460400"/>
           </a:xfrm>
           <a:prstGeom prst="rect">
             <a:avLst/>
@@ -9624,7 +10227,7 @@
         <p:spPr>
           <a:xfrm>
             <a:off x="610920" y="259920"/>
-            <a:ext cx="7917840" cy="861840"/>
+            <a:ext cx="7917480" cy="861480"/>
           </a:xfrm>
           <a:prstGeom prst="rect">
             <a:avLst/>
@@ -9656,7 +10259,7 @@
         <p:spPr>
           <a:xfrm>
             <a:off x="674640" y="1482480"/>
-            <a:ext cx="7918200" cy="1260360"/>
+            <a:ext cx="7917840" cy="1260000"/>
           </a:xfrm>
           <a:prstGeom prst="rect">
             <a:avLst/>
@@ -9718,7 +10321,7 @@
         <p:spPr>
           <a:xfrm>
             <a:off x="1097280" y="3017520"/>
-            <a:ext cx="2102760" cy="1405800"/>
+            <a:ext cx="2102400" cy="1405440"/>
           </a:xfrm>
           <a:prstGeom prst="rect">
             <a:avLst/>
@@ -9766,7 +10369,7 @@
         <p:spPr>
           <a:xfrm>
             <a:off x="5669280" y="2947680"/>
-            <a:ext cx="2102760" cy="1405800"/>
+            <a:ext cx="2102400" cy="1405440"/>
           </a:xfrm>
           <a:prstGeom prst="rect">
             <a:avLst/>
@@ -9863,7 +10466,7 @@
         <p:spPr>
           <a:xfrm>
             <a:off x="610920" y="259920"/>
-            <a:ext cx="7917840" cy="861840"/>
+            <a:ext cx="7917480" cy="861480"/>
           </a:xfrm>
           <a:prstGeom prst="rect">
             <a:avLst/>
@@ -9895,7 +10498,7 @@
         <p:spPr>
           <a:xfrm>
             <a:off x="674640" y="1482480"/>
-            <a:ext cx="7918200" cy="1260360"/>
+            <a:ext cx="7917840" cy="1260000"/>
           </a:xfrm>
           <a:prstGeom prst="rect">
             <a:avLst/>
@@ -9969,7 +10572,7 @@
         <p:spPr>
           <a:xfrm>
             <a:off x="1097280" y="3017520"/>
-            <a:ext cx="2102760" cy="1405800"/>
+            <a:ext cx="2102400" cy="1405440"/>
           </a:xfrm>
           <a:prstGeom prst="rect">
             <a:avLst/>
@@ -10017,7 +10620,7 @@
         <p:spPr>
           <a:xfrm>
             <a:off x="5669280" y="2947680"/>
-            <a:ext cx="2102760" cy="1405800"/>
+            <a:ext cx="2102400" cy="1405440"/>
           </a:xfrm>
           <a:prstGeom prst="rect">
             <a:avLst/>
@@ -10065,7 +10668,7 @@
         <p:spPr>
           <a:xfrm>
             <a:off x="3200400" y="2305440"/>
-            <a:ext cx="2377440" cy="1169280"/>
+            <a:ext cx="2377080" cy="1168920"/>
           </a:xfrm>
           <a:prstGeom prst="rect">
             <a:avLst/>
@@ -10088,7 +10691,7 @@
         <p:spPr>
           <a:xfrm>
             <a:off x="3291840" y="3840480"/>
-            <a:ext cx="2377440" cy="1169280"/>
+            <a:ext cx="2377080" cy="1168920"/>
           </a:xfrm>
           <a:prstGeom prst="rect">
             <a:avLst/>
@@ -10111,7 +10714,7 @@
         <p:spPr>
           <a:xfrm>
             <a:off x="1645920" y="4480560"/>
-            <a:ext cx="1005840" cy="1924920"/>
+            <a:ext cx="1005480" cy="1924560"/>
           </a:xfrm>
           <a:prstGeom prst="rect">
             <a:avLst/>
@@ -10183,7 +10786,7 @@
         <p:spPr>
           <a:xfrm>
             <a:off x="610920" y="259920"/>
-            <a:ext cx="7917840" cy="861840"/>
+            <a:ext cx="7917480" cy="861480"/>
           </a:xfrm>
           <a:prstGeom prst="rect">
             <a:avLst/>
@@ -10215,7 +10818,7 @@
         <p:spPr>
           <a:xfrm>
             <a:off x="674640" y="1482480"/>
-            <a:ext cx="7918200" cy="1260360"/>
+            <a:ext cx="7917840" cy="1260000"/>
           </a:xfrm>
           <a:prstGeom prst="rect">
             <a:avLst/>
@@ -10281,7 +10884,7 @@
         <p:spPr>
           <a:xfrm>
             <a:off x="365760" y="3017520"/>
-            <a:ext cx="2834280" cy="1832400"/>
+            <a:ext cx="2833920" cy="1832040"/>
           </a:xfrm>
           <a:prstGeom prst="rect">
             <a:avLst/>
@@ -10352,7 +10955,7 @@
         <p:spPr>
           <a:xfrm>
             <a:off x="5669280" y="2947680"/>
-            <a:ext cx="3017160" cy="1832400"/>
+            <a:ext cx="3016800" cy="1832040"/>
           </a:xfrm>
           <a:prstGeom prst="rect">
             <a:avLst/>
@@ -10423,7 +11026,7 @@
         <p:spPr>
           <a:xfrm>
             <a:off x="3200400" y="2305440"/>
-            <a:ext cx="2377440" cy="1169280"/>
+            <a:ext cx="2377080" cy="1168920"/>
           </a:xfrm>
           <a:prstGeom prst="rect">
             <a:avLst/>
@@ -10446,7 +11049,7 @@
         <p:spPr>
           <a:xfrm>
             <a:off x="3291840" y="3840480"/>
-            <a:ext cx="2377440" cy="1169280"/>
+            <a:ext cx="2377080" cy="1168920"/>
           </a:xfrm>
           <a:prstGeom prst="rect">
             <a:avLst/>
@@ -10518,7 +11121,7 @@
         <p:spPr>
           <a:xfrm>
             <a:off x="610920" y="259920"/>
-            <a:ext cx="7917840" cy="861840"/>
+            <a:ext cx="7917480" cy="861480"/>
           </a:xfrm>
           <a:prstGeom prst="rect">
             <a:avLst/>
@@ -10549,8 +11152,8 @@
         </p:nvSpPr>
         <p:spPr>
           <a:xfrm>
-            <a:off x="674640" y="1400040"/>
-            <a:ext cx="7918200" cy="4460760"/>
+            <a:off x="677520" y="1391760"/>
+            <a:ext cx="7917840" cy="4460400"/>
           </a:xfrm>
           <a:prstGeom prst="rect">
             <a:avLst/>
@@ -10594,11 +11197,20 @@
             <a:r>
               <a:rPr lang="en-US" sz="2400">
                 <a:solidFill>
+                  <a:srgbClr val="000000"/>
+                </a:solidFill>
+                <a:latin typeface="Arial"/>
+              </a:rPr>
+              <a:t>An</a:t>
+            </a:r>
+            <a:r>
+              <a:rPr lang="en-US" sz="2400">
+                <a:solidFill>
                   <a:srgbClr val="000080"/>
                 </a:solidFill>
                 <a:latin typeface="Arial"/>
               </a:rPr>
-              <a:t>An </a:t>
+              <a:t> </a:t>
             </a:r>
             <a:r>
               <a:rPr lang="en-US" sz="2400">
@@ -10607,24 +11219,17 @@
                 </a:solidFill>
                 <a:latin typeface="Arial"/>
               </a:rPr>
-              <a:t>action is (nearly) instantaneous.</a:t>
-            </a:r>
-            <a:endParaRPr/>
-          </a:p>
-          <a:p>
-            <a:pPr>
-              <a:lnSpc>
-                <a:spcPct val="100000"/>
-              </a:lnSpc>
-            </a:pPr>
-            <a:endParaRPr/>
-          </a:p>
-          <a:p>
-            <a:pPr>
-              <a:lnSpc>
-                <a:spcPct val="100000"/>
-              </a:lnSpc>
-            </a:pPr>
+              <a:t>action </a:t>
+            </a:r>
+            <a:r>
+              <a:rPr lang="en-US" sz="2400">
+                <a:solidFill>
+                  <a:srgbClr val="000000"/>
+                </a:solidFill>
+                <a:latin typeface="Arial"/>
+              </a:rPr>
+              <a:t>is (nearly)</a:t>
+            </a:r>
             <a:r>
               <a:rPr lang="en-US" sz="2400">
                 <a:solidFill>
@@ -10632,12 +11237,37 @@
                 </a:solidFill>
                 <a:latin typeface="Arial"/>
               </a:rPr>
+              <a:t> instantaneous.</a:t>
+            </a:r>
+            <a:endParaRPr/>
+          </a:p>
+          <a:p>
+            <a:pPr>
+              <a:lnSpc>
+                <a:spcPct val="100000"/>
+              </a:lnSpc>
+            </a:pPr>
+            <a:endParaRPr/>
+          </a:p>
+          <a:p>
+            <a:pPr>
+              <a:lnSpc>
+                <a:spcPct val="100000"/>
+              </a:lnSpc>
+            </a:pPr>
+            <a:r>
+              <a:rPr lang="en-US" sz="2400">
+                <a:solidFill>
+                  <a:srgbClr val="000000"/>
+                </a:solidFill>
+                <a:latin typeface="Arial"/>
+              </a:rPr>
               <a:t>In the UI for StopWatch, "</a:t>
             </a:r>
             <a:r>
               <a:rPr i="1" lang="en-US" sz="2400">
                 <a:solidFill>
-                  <a:srgbClr val="000080"/>
+                  <a:srgbClr val="000000"/>
                 </a:solidFill>
                 <a:latin typeface="Arial"/>
               </a:rPr>
@@ -10646,7 +11276,7 @@
             <a:r>
               <a:rPr lang="en-US" sz="2400">
                 <a:solidFill>
-                  <a:srgbClr val="000080"/>
+                  <a:srgbClr val="000000"/>
                 </a:solidFill>
                 <a:latin typeface="Arial"/>
               </a:rPr>
@@ -10737,7 +11367,7 @@
         <p:spPr>
           <a:xfrm>
             <a:off x="611280" y="259920"/>
-            <a:ext cx="7921080" cy="864720"/>
+            <a:ext cx="7920720" cy="864360"/>
           </a:xfrm>
           <a:prstGeom prst="rect">
             <a:avLst/>
@@ -10774,7 +11404,7 @@
         <p:spPr>
           <a:xfrm>
             <a:off x="611280" y="1447920"/>
-            <a:ext cx="7921080" cy="4495320"/>
+            <a:ext cx="7920720" cy="4494960"/>
           </a:xfrm>
           <a:prstGeom prst="rect">
             <a:avLst/>
@@ -10991,7 +11621,7 @@
         <p:spPr>
           <a:xfrm>
             <a:off x="611280" y="259920"/>
-            <a:ext cx="7921080" cy="864720"/>
+            <a:ext cx="7920720" cy="864360"/>
           </a:xfrm>
           <a:prstGeom prst="rect">
             <a:avLst/>
@@ -11028,7 +11658,7 @@
         <p:spPr>
           <a:xfrm>
             <a:off x="611280" y="1447920"/>
-            <a:ext cx="7921080" cy="746280"/>
+            <a:ext cx="7920720" cy="745920"/>
           </a:xfrm>
           <a:prstGeom prst="rect">
             <a:avLst/>
@@ -11101,7 +11731,7 @@
         <p:spPr>
           <a:xfrm>
             <a:off x="607680" y="2011680"/>
-            <a:ext cx="7924680" cy="3523680"/>
+            <a:ext cx="7924320" cy="3523320"/>
           </a:xfrm>
           <a:prstGeom prst="rect">
             <a:avLst/>

</xml_diff>